<commit_message>
Added some preliminary outputs in the presentation
</commit_message>
<xml_diff>
--- a/activefence/extract.pptx
+++ b/activefence/extract.pptx
@@ -9,6 +9,8 @@
     <p:sldId id="257" r:id="rId3"/>
     <p:sldId id="258" r:id="rId4"/>
     <p:sldId id="259" r:id="rId5"/>
+    <p:sldId id="260" r:id="rId6"/>
+    <p:sldId id="261" r:id="rId7"/>
   </p:sldIdLst>
   <p:sldSz cx="12192000" cy="6858000"/>
   <p:notesSz cx="6858000" cy="9144000"/>
@@ -246,7 +248,7 @@
           <a:p>
             <a:fld id="{90139234-86BD-40A6-83E6-2AE3818AAA65}" type="datetimeFigureOut">
               <a:rPr lang="en-PH" smtClean="0"/>
-              <a:t>17/10/2023</a:t>
+              <a:t>19/10/2023</a:t>
             </a:fld>
             <a:endParaRPr lang="en-PH"/>
           </a:p>
@@ -416,7 +418,7 @@
           <a:p>
             <a:fld id="{90139234-86BD-40A6-83E6-2AE3818AAA65}" type="datetimeFigureOut">
               <a:rPr lang="en-PH" smtClean="0"/>
-              <a:t>17/10/2023</a:t>
+              <a:t>19/10/2023</a:t>
             </a:fld>
             <a:endParaRPr lang="en-PH"/>
           </a:p>
@@ -596,7 +598,7 @@
           <a:p>
             <a:fld id="{90139234-86BD-40A6-83E6-2AE3818AAA65}" type="datetimeFigureOut">
               <a:rPr lang="en-PH" smtClean="0"/>
-              <a:t>17/10/2023</a:t>
+              <a:t>19/10/2023</a:t>
             </a:fld>
             <a:endParaRPr lang="en-PH"/>
           </a:p>
@@ -766,7 +768,7 @@
           <a:p>
             <a:fld id="{90139234-86BD-40A6-83E6-2AE3818AAA65}" type="datetimeFigureOut">
               <a:rPr lang="en-PH" smtClean="0"/>
-              <a:t>17/10/2023</a:t>
+              <a:t>19/10/2023</a:t>
             </a:fld>
             <a:endParaRPr lang="en-PH"/>
           </a:p>
@@ -1012,7 +1014,7 @@
           <a:p>
             <a:fld id="{90139234-86BD-40A6-83E6-2AE3818AAA65}" type="datetimeFigureOut">
               <a:rPr lang="en-PH" smtClean="0"/>
-              <a:t>17/10/2023</a:t>
+              <a:t>19/10/2023</a:t>
             </a:fld>
             <a:endParaRPr lang="en-PH"/>
           </a:p>
@@ -1244,7 +1246,7 @@
           <a:p>
             <a:fld id="{90139234-86BD-40A6-83E6-2AE3818AAA65}" type="datetimeFigureOut">
               <a:rPr lang="en-PH" smtClean="0"/>
-              <a:t>17/10/2023</a:t>
+              <a:t>19/10/2023</a:t>
             </a:fld>
             <a:endParaRPr lang="en-PH"/>
           </a:p>
@@ -1611,7 +1613,7 @@
           <a:p>
             <a:fld id="{90139234-86BD-40A6-83E6-2AE3818AAA65}" type="datetimeFigureOut">
               <a:rPr lang="en-PH" smtClean="0"/>
-              <a:t>17/10/2023</a:t>
+              <a:t>19/10/2023</a:t>
             </a:fld>
             <a:endParaRPr lang="en-PH"/>
           </a:p>
@@ -1729,7 +1731,7 @@
           <a:p>
             <a:fld id="{90139234-86BD-40A6-83E6-2AE3818AAA65}" type="datetimeFigureOut">
               <a:rPr lang="en-PH" smtClean="0"/>
-              <a:t>17/10/2023</a:t>
+              <a:t>19/10/2023</a:t>
             </a:fld>
             <a:endParaRPr lang="en-PH"/>
           </a:p>
@@ -1824,7 +1826,7 @@
           <a:p>
             <a:fld id="{90139234-86BD-40A6-83E6-2AE3818AAA65}" type="datetimeFigureOut">
               <a:rPr lang="en-PH" smtClean="0"/>
-              <a:t>17/10/2023</a:t>
+              <a:t>19/10/2023</a:t>
             </a:fld>
             <a:endParaRPr lang="en-PH"/>
           </a:p>
@@ -2101,7 +2103,7 @@
           <a:p>
             <a:fld id="{90139234-86BD-40A6-83E6-2AE3818AAA65}" type="datetimeFigureOut">
               <a:rPr lang="en-PH" smtClean="0"/>
-              <a:t>17/10/2023</a:t>
+              <a:t>19/10/2023</a:t>
             </a:fld>
             <a:endParaRPr lang="en-PH"/>
           </a:p>
@@ -2354,7 +2356,7 @@
           <a:p>
             <a:fld id="{90139234-86BD-40A6-83E6-2AE3818AAA65}" type="datetimeFigureOut">
               <a:rPr lang="en-PH" smtClean="0"/>
-              <a:t>17/10/2023</a:t>
+              <a:t>19/10/2023</a:t>
             </a:fld>
             <a:endParaRPr lang="en-PH"/>
           </a:p>
@@ -2567,7 +2569,7 @@
           <a:p>
             <a:fld id="{90139234-86BD-40A6-83E6-2AE3818AAA65}" type="datetimeFigureOut">
               <a:rPr lang="en-PH" smtClean="0"/>
-              <a:t>17/10/2023</a:t>
+              <a:t>19/10/2023</a:t>
             </a:fld>
             <a:endParaRPr lang="en-PH"/>
           </a:p>
@@ -3869,6 +3871,114 @@
 </p:sld>
 </file>
 
+<file path=ppt/slides/slide5.xml><?xml version="1.0" encoding="utf-8"?>
+<p:sld xmlns:a="http://schemas.openxmlformats.org/drawingml/2006/main" xmlns:r="http://schemas.openxmlformats.org/officeDocument/2006/relationships" xmlns:p="http://schemas.openxmlformats.org/presentationml/2006/main">
+  <p:cSld>
+    <p:spTree>
+      <p:nvGrpSpPr>
+        <p:cNvPr id="1" name=""/>
+        <p:cNvGrpSpPr/>
+        <p:nvPr/>
+      </p:nvGrpSpPr>
+      <p:grpSpPr>
+        <a:xfrm>
+          <a:off x="0" y="0"/>
+          <a:ext cx="0" cy="0"/>
+          <a:chOff x="0" y="0"/>
+          <a:chExt cx="0" cy="0"/>
+        </a:xfrm>
+      </p:grpSpPr>
+      <p:pic>
+        <p:nvPicPr>
+          <p:cNvPr id="2" name="Picture 1"/>
+          <p:cNvPicPr>
+            <a:picLocks noChangeAspect="1"/>
+          </p:cNvPicPr>
+          <p:nvPr/>
+        </p:nvPicPr>
+        <p:blipFill>
+          <a:blip r:embed="rId2"/>
+          <a:stretch>
+            <a:fillRect/>
+          </a:stretch>
+        </p:blipFill>
+        <p:spPr>
+          <a:xfrm>
+            <a:off x="640979" y="1446412"/>
+            <a:ext cx="11160000" cy="3683092"/>
+          </a:xfrm>
+          <a:prstGeom prst="rect">
+            <a:avLst/>
+          </a:prstGeom>
+        </p:spPr>
+      </p:pic>
+    </p:spTree>
+    <p:extLst>
+      <p:ext uri="{BB962C8B-B14F-4D97-AF65-F5344CB8AC3E}">
+        <p14:creationId xmlns:p14="http://schemas.microsoft.com/office/powerpoint/2010/main" val="1737147526"/>
+      </p:ext>
+    </p:extLst>
+  </p:cSld>
+  <p:clrMapOvr>
+    <a:masterClrMapping/>
+  </p:clrMapOvr>
+</p:sld>
+</file>
+
+<file path=ppt/slides/slide6.xml><?xml version="1.0" encoding="utf-8"?>
+<p:sld xmlns:a="http://schemas.openxmlformats.org/drawingml/2006/main" xmlns:r="http://schemas.openxmlformats.org/officeDocument/2006/relationships" xmlns:p="http://schemas.openxmlformats.org/presentationml/2006/main">
+  <p:cSld>
+    <p:spTree>
+      <p:nvGrpSpPr>
+        <p:cNvPr id="1" name=""/>
+        <p:cNvGrpSpPr/>
+        <p:nvPr/>
+      </p:nvGrpSpPr>
+      <p:grpSpPr>
+        <a:xfrm>
+          <a:off x="0" y="0"/>
+          <a:ext cx="0" cy="0"/>
+          <a:chOff x="0" y="0"/>
+          <a:chExt cx="0" cy="0"/>
+        </a:xfrm>
+      </p:grpSpPr>
+      <p:pic>
+        <p:nvPicPr>
+          <p:cNvPr id="2" name="Picture 1"/>
+          <p:cNvPicPr>
+            <a:picLocks noChangeAspect="1"/>
+          </p:cNvPicPr>
+          <p:nvPr/>
+        </p:nvPicPr>
+        <p:blipFill>
+          <a:blip r:embed="rId2"/>
+          <a:stretch>
+            <a:fillRect/>
+          </a:stretch>
+        </p:blipFill>
+        <p:spPr>
+          <a:xfrm>
+            <a:off x="644407" y="1248904"/>
+            <a:ext cx="11160000" cy="4665960"/>
+          </a:xfrm>
+          <a:prstGeom prst="rect">
+            <a:avLst/>
+          </a:prstGeom>
+        </p:spPr>
+      </p:pic>
+    </p:spTree>
+    <p:extLst>
+      <p:ext uri="{BB962C8B-B14F-4D97-AF65-F5344CB8AC3E}">
+        <p14:creationId xmlns:p14="http://schemas.microsoft.com/office/powerpoint/2010/main" val="2537272757"/>
+      </p:ext>
+    </p:extLst>
+  </p:cSld>
+  <p:clrMapOvr>
+    <a:masterClrMapping/>
+  </p:clrMapOvr>
+</p:sld>
+</file>
+
 <file path=ppt/theme/theme1.xml><?xml version="1.0" encoding="utf-8"?>
 <a:theme xmlns:a="http://schemas.openxmlformats.org/drawingml/2006/main" name="Office Theme">
   <a:themeElements>

</xml_diff>

<commit_message>
Added more extraction information in the slides
</commit_message>
<xml_diff>
--- a/activefence/extract.pptx
+++ b/activefence/extract.pptx
@@ -11,6 +11,15 @@
     <p:sldId id="259" r:id="rId5"/>
     <p:sldId id="260" r:id="rId6"/>
     <p:sldId id="261" r:id="rId7"/>
+    <p:sldId id="262" r:id="rId8"/>
+    <p:sldId id="263" r:id="rId9"/>
+    <p:sldId id="264" r:id="rId10"/>
+    <p:sldId id="265" r:id="rId11"/>
+    <p:sldId id="266" r:id="rId12"/>
+    <p:sldId id="267" r:id="rId13"/>
+    <p:sldId id="268" r:id="rId14"/>
+    <p:sldId id="269" r:id="rId15"/>
+    <p:sldId id="270" r:id="rId16"/>
   </p:sldIdLst>
   <p:sldSz cx="12192000" cy="6858000"/>
   <p:notesSz cx="6858000" cy="9144000"/>
@@ -248,7 +257,7 @@
           <a:p>
             <a:fld id="{90139234-86BD-40A6-83E6-2AE3818AAA65}" type="datetimeFigureOut">
               <a:rPr lang="en-PH" smtClean="0"/>
-              <a:t>19/10/2023</a:t>
+              <a:t>01/11/2023</a:t>
             </a:fld>
             <a:endParaRPr lang="en-PH"/>
           </a:p>
@@ -418,7 +427,7 @@
           <a:p>
             <a:fld id="{90139234-86BD-40A6-83E6-2AE3818AAA65}" type="datetimeFigureOut">
               <a:rPr lang="en-PH" smtClean="0"/>
-              <a:t>19/10/2023</a:t>
+              <a:t>01/11/2023</a:t>
             </a:fld>
             <a:endParaRPr lang="en-PH"/>
           </a:p>
@@ -598,7 +607,7 @@
           <a:p>
             <a:fld id="{90139234-86BD-40A6-83E6-2AE3818AAA65}" type="datetimeFigureOut">
               <a:rPr lang="en-PH" smtClean="0"/>
-              <a:t>19/10/2023</a:t>
+              <a:t>01/11/2023</a:t>
             </a:fld>
             <a:endParaRPr lang="en-PH"/>
           </a:p>
@@ -768,7 +777,7 @@
           <a:p>
             <a:fld id="{90139234-86BD-40A6-83E6-2AE3818AAA65}" type="datetimeFigureOut">
               <a:rPr lang="en-PH" smtClean="0"/>
-              <a:t>19/10/2023</a:t>
+              <a:t>01/11/2023</a:t>
             </a:fld>
             <a:endParaRPr lang="en-PH"/>
           </a:p>
@@ -1014,7 +1023,7 @@
           <a:p>
             <a:fld id="{90139234-86BD-40A6-83E6-2AE3818AAA65}" type="datetimeFigureOut">
               <a:rPr lang="en-PH" smtClean="0"/>
-              <a:t>19/10/2023</a:t>
+              <a:t>01/11/2023</a:t>
             </a:fld>
             <a:endParaRPr lang="en-PH"/>
           </a:p>
@@ -1246,7 +1255,7 @@
           <a:p>
             <a:fld id="{90139234-86BD-40A6-83E6-2AE3818AAA65}" type="datetimeFigureOut">
               <a:rPr lang="en-PH" smtClean="0"/>
-              <a:t>19/10/2023</a:t>
+              <a:t>01/11/2023</a:t>
             </a:fld>
             <a:endParaRPr lang="en-PH"/>
           </a:p>
@@ -1613,7 +1622,7 @@
           <a:p>
             <a:fld id="{90139234-86BD-40A6-83E6-2AE3818AAA65}" type="datetimeFigureOut">
               <a:rPr lang="en-PH" smtClean="0"/>
-              <a:t>19/10/2023</a:t>
+              <a:t>01/11/2023</a:t>
             </a:fld>
             <a:endParaRPr lang="en-PH"/>
           </a:p>
@@ -1731,7 +1740,7 @@
           <a:p>
             <a:fld id="{90139234-86BD-40A6-83E6-2AE3818AAA65}" type="datetimeFigureOut">
               <a:rPr lang="en-PH" smtClean="0"/>
-              <a:t>19/10/2023</a:t>
+              <a:t>01/11/2023</a:t>
             </a:fld>
             <a:endParaRPr lang="en-PH"/>
           </a:p>
@@ -1826,7 +1835,7 @@
           <a:p>
             <a:fld id="{90139234-86BD-40A6-83E6-2AE3818AAA65}" type="datetimeFigureOut">
               <a:rPr lang="en-PH" smtClean="0"/>
-              <a:t>19/10/2023</a:t>
+              <a:t>01/11/2023</a:t>
             </a:fld>
             <a:endParaRPr lang="en-PH"/>
           </a:p>
@@ -2103,7 +2112,7 @@
           <a:p>
             <a:fld id="{90139234-86BD-40A6-83E6-2AE3818AAA65}" type="datetimeFigureOut">
               <a:rPr lang="en-PH" smtClean="0"/>
-              <a:t>19/10/2023</a:t>
+              <a:t>01/11/2023</a:t>
             </a:fld>
             <a:endParaRPr lang="en-PH"/>
           </a:p>
@@ -2356,7 +2365,7 @@
           <a:p>
             <a:fld id="{90139234-86BD-40A6-83E6-2AE3818AAA65}" type="datetimeFigureOut">
               <a:rPr lang="en-PH" smtClean="0"/>
-              <a:t>19/10/2023</a:t>
+              <a:t>01/11/2023</a:t>
             </a:fld>
             <a:endParaRPr lang="en-PH"/>
           </a:p>
@@ -2569,7 +2578,7 @@
           <a:p>
             <a:fld id="{90139234-86BD-40A6-83E6-2AE3818AAA65}" type="datetimeFigureOut">
               <a:rPr lang="en-PH" smtClean="0"/>
-              <a:t>19/10/2023</a:t>
+              <a:t>01/11/2023</a:t>
             </a:fld>
             <a:endParaRPr lang="en-PH"/>
           </a:p>
@@ -3016,6 +3025,2122 @@
     <p:extLst>
       <p:ext uri="{BB962C8B-B14F-4D97-AF65-F5344CB8AC3E}">
         <p14:creationId xmlns:p14="http://schemas.microsoft.com/office/powerpoint/2010/main" val="2852034437"/>
+      </p:ext>
+    </p:extLst>
+  </p:cSld>
+  <p:clrMapOvr>
+    <a:masterClrMapping/>
+  </p:clrMapOvr>
+</p:sld>
+</file>
+
+<file path=ppt/slides/slide10.xml><?xml version="1.0" encoding="utf-8"?>
+<p:sld xmlns:a="http://schemas.openxmlformats.org/drawingml/2006/main" xmlns:r="http://schemas.openxmlformats.org/officeDocument/2006/relationships" xmlns:p="http://schemas.openxmlformats.org/presentationml/2006/main">
+  <p:cSld>
+    <p:spTree>
+      <p:nvGrpSpPr>
+        <p:cNvPr id="1" name=""/>
+        <p:cNvGrpSpPr/>
+        <p:nvPr/>
+      </p:nvGrpSpPr>
+      <p:grpSpPr>
+        <a:xfrm>
+          <a:off x="0" y="0"/>
+          <a:ext cx="0" cy="0"/>
+          <a:chOff x="0" y="0"/>
+          <a:chExt cx="0" cy="0"/>
+        </a:xfrm>
+      </p:grpSpPr>
+      <p:grpSp>
+        <p:nvGrpSpPr>
+          <p:cNvPr id="72" name="Group 71"/>
+          <p:cNvGrpSpPr/>
+          <p:nvPr/>
+        </p:nvGrpSpPr>
+        <p:grpSpPr>
+          <a:xfrm>
+            <a:off x="204281" y="413794"/>
+            <a:ext cx="11880000" cy="6333111"/>
+            <a:chOff x="204281" y="413794"/>
+            <a:chExt cx="11880000" cy="6333111"/>
+          </a:xfrm>
+        </p:grpSpPr>
+        <p:pic>
+          <p:nvPicPr>
+            <p:cNvPr id="2" name="Picture 1"/>
+            <p:cNvPicPr>
+              <a:picLocks noChangeAspect="1"/>
+            </p:cNvPicPr>
+            <p:nvPr/>
+          </p:nvPicPr>
+          <p:blipFill>
+            <a:blip r:embed="rId2"/>
+            <a:stretch>
+              <a:fillRect/>
+            </a:stretch>
+          </p:blipFill>
+          <p:spPr>
+            <a:xfrm>
+              <a:off x="204281" y="413794"/>
+              <a:ext cx="11880000" cy="6333111"/>
+            </a:xfrm>
+            <a:prstGeom prst="rect">
+              <a:avLst/>
+            </a:prstGeom>
+          </p:spPr>
+        </p:pic>
+        <p:cxnSp>
+          <p:nvCxnSpPr>
+            <p:cNvPr id="16" name="Straight Arrow Connector 15"/>
+            <p:cNvCxnSpPr>
+              <a:endCxn id="17" idx="1"/>
+            </p:cNvCxnSpPr>
+            <p:nvPr/>
+          </p:nvCxnSpPr>
+          <p:spPr>
+            <a:xfrm flipV="1">
+              <a:off x="7062359" y="1302996"/>
+              <a:ext cx="813291" cy="569961"/>
+            </a:xfrm>
+            <a:prstGeom prst="straightConnector1">
+              <a:avLst/>
+            </a:prstGeom>
+            <a:ln w="19050">
+              <a:solidFill>
+                <a:srgbClr val="00B050"/>
+              </a:solidFill>
+              <a:tailEnd type="triangle"/>
+            </a:ln>
+          </p:spPr>
+          <p:style>
+            <a:lnRef idx="1">
+              <a:schemeClr val="accent1"/>
+            </a:lnRef>
+            <a:fillRef idx="0">
+              <a:schemeClr val="accent1"/>
+            </a:fillRef>
+            <a:effectRef idx="0">
+              <a:schemeClr val="accent1"/>
+            </a:effectRef>
+            <a:fontRef idx="minor">
+              <a:schemeClr val="tx1"/>
+            </a:fontRef>
+          </p:style>
+        </p:cxnSp>
+        <p:sp>
+          <p:nvSpPr>
+            <p:cNvPr id="17" name="TextBox 16"/>
+            <p:cNvSpPr txBox="1"/>
+            <p:nvPr/>
+          </p:nvSpPr>
+          <p:spPr>
+            <a:xfrm>
+              <a:off x="7875650" y="887497"/>
+              <a:ext cx="1507457" cy="830997"/>
+            </a:xfrm>
+            <a:prstGeom prst="rect">
+              <a:avLst/>
+            </a:prstGeom>
+            <a:solidFill>
+              <a:schemeClr val="accent3">
+                <a:lumMod val="20000"/>
+                <a:lumOff val="80000"/>
+              </a:schemeClr>
+            </a:solidFill>
+          </p:spPr>
+          <p:txBody>
+            <a:bodyPr wrap="square" rtlCol="0">
+              <a:spAutoFit/>
+            </a:bodyPr>
+            <a:lstStyle/>
+            <a:p>
+              <a:pPr algn="ctr"/>
+              <a:r>
+                <a:rPr lang="en-US" sz="1600" dirty="0" smtClean="0">
+                  <a:solidFill>
+                    <a:srgbClr val="00B050"/>
+                  </a:solidFill>
+                </a:rPr>
+                <a:t>Images </a:t>
+              </a:r>
+              <a:r>
+                <a:rPr lang="en-US" sz="1600" dirty="0" smtClean="0"/>
+                <a:t>and </a:t>
+              </a:r>
+              <a:r>
+                <a:rPr lang="en-US" sz="1600" dirty="0" smtClean="0">
+                  <a:solidFill>
+                    <a:srgbClr val="00B0F0"/>
+                  </a:solidFill>
+                </a:rPr>
+                <a:t>texts </a:t>
+              </a:r>
+              <a:r>
+                <a:rPr lang="en-US" sz="1600" dirty="0" smtClean="0"/>
+                <a:t>to be extracted…</a:t>
+              </a:r>
+              <a:endParaRPr lang="en-PH" sz="1600" dirty="0">
+                <a:solidFill>
+                  <a:srgbClr val="00B050"/>
+                </a:solidFill>
+              </a:endParaRPr>
+            </a:p>
+          </p:txBody>
+        </p:sp>
+        <p:sp>
+          <p:nvSpPr>
+            <p:cNvPr id="19" name="Rectangle 18"/>
+            <p:cNvSpPr/>
+            <p:nvPr/>
+          </p:nvSpPr>
+          <p:spPr>
+            <a:xfrm>
+              <a:off x="6774350" y="1884205"/>
+              <a:ext cx="576019" cy="516095"/>
+            </a:xfrm>
+            <a:prstGeom prst="rect">
+              <a:avLst/>
+            </a:prstGeom>
+            <a:noFill/>
+            <a:ln w="38100">
+              <a:solidFill>
+                <a:srgbClr val="00B050"/>
+              </a:solidFill>
+            </a:ln>
+          </p:spPr>
+          <p:style>
+            <a:lnRef idx="2">
+              <a:schemeClr val="accent1">
+                <a:shade val="50000"/>
+              </a:schemeClr>
+            </a:lnRef>
+            <a:fillRef idx="1">
+              <a:schemeClr val="accent1"/>
+            </a:fillRef>
+            <a:effectRef idx="0">
+              <a:schemeClr val="accent1"/>
+            </a:effectRef>
+            <a:fontRef idx="minor">
+              <a:schemeClr val="lt1"/>
+            </a:fontRef>
+          </p:style>
+          <p:txBody>
+            <a:bodyPr rtlCol="0" anchor="ctr"/>
+            <a:lstStyle/>
+            <a:p>
+              <a:pPr algn="ctr"/>
+              <a:endParaRPr lang="en-PH"/>
+            </a:p>
+          </p:txBody>
+        </p:sp>
+        <p:sp>
+          <p:nvSpPr>
+            <p:cNvPr id="22" name="Rectangle 21"/>
+            <p:cNvSpPr/>
+            <p:nvPr/>
+          </p:nvSpPr>
+          <p:spPr>
+            <a:xfrm>
+              <a:off x="6582154" y="2607696"/>
+              <a:ext cx="979231" cy="627873"/>
+            </a:xfrm>
+            <a:prstGeom prst="rect">
+              <a:avLst/>
+            </a:prstGeom>
+            <a:noFill/>
+            <a:ln w="28575">
+              <a:solidFill>
+                <a:srgbClr val="00B0F0"/>
+              </a:solidFill>
+            </a:ln>
+          </p:spPr>
+          <p:style>
+            <a:lnRef idx="2">
+              <a:schemeClr val="accent1">
+                <a:shade val="50000"/>
+              </a:schemeClr>
+            </a:lnRef>
+            <a:fillRef idx="1">
+              <a:schemeClr val="accent1"/>
+            </a:fillRef>
+            <a:effectRef idx="0">
+              <a:schemeClr val="accent1"/>
+            </a:effectRef>
+            <a:fontRef idx="minor">
+              <a:schemeClr val="lt1"/>
+            </a:fontRef>
+          </p:style>
+          <p:txBody>
+            <a:bodyPr rtlCol="0" anchor="ctr"/>
+            <a:lstStyle/>
+            <a:p>
+              <a:pPr algn="ctr"/>
+              <a:endParaRPr lang="en-PH"/>
+            </a:p>
+          </p:txBody>
+        </p:sp>
+        <p:cxnSp>
+          <p:nvCxnSpPr>
+            <p:cNvPr id="23" name="Straight Arrow Connector 22"/>
+            <p:cNvCxnSpPr/>
+            <p:nvPr/>
+          </p:nvCxnSpPr>
+          <p:spPr>
+            <a:xfrm flipH="1" flipV="1">
+              <a:off x="8637641" y="1718494"/>
+              <a:ext cx="13648" cy="816958"/>
+            </a:xfrm>
+            <a:prstGeom prst="straightConnector1">
+              <a:avLst/>
+            </a:prstGeom>
+            <a:ln w="28575">
+              <a:solidFill>
+                <a:srgbClr val="00B0F0"/>
+              </a:solidFill>
+              <a:tailEnd type="triangle"/>
+            </a:ln>
+          </p:spPr>
+          <p:style>
+            <a:lnRef idx="1">
+              <a:schemeClr val="accent1"/>
+            </a:lnRef>
+            <a:fillRef idx="0">
+              <a:schemeClr val="accent1"/>
+            </a:fillRef>
+            <a:effectRef idx="0">
+              <a:schemeClr val="accent1"/>
+            </a:effectRef>
+            <a:fontRef idx="minor">
+              <a:schemeClr val="tx1"/>
+            </a:fontRef>
+          </p:style>
+        </p:cxnSp>
+        <p:cxnSp>
+          <p:nvCxnSpPr>
+            <p:cNvPr id="36" name="Straight Arrow Connector 35"/>
+            <p:cNvCxnSpPr>
+              <a:stCxn id="37" idx="0"/>
+              <a:endCxn id="17" idx="2"/>
+            </p:cNvCxnSpPr>
+            <p:nvPr/>
+          </p:nvCxnSpPr>
+          <p:spPr>
+            <a:xfrm flipV="1">
+              <a:off x="8105952" y="1718494"/>
+              <a:ext cx="523427" cy="187525"/>
+            </a:xfrm>
+            <a:prstGeom prst="straightConnector1">
+              <a:avLst/>
+            </a:prstGeom>
+            <a:ln w="19050">
+              <a:solidFill>
+                <a:srgbClr val="00B050"/>
+              </a:solidFill>
+              <a:tailEnd type="triangle"/>
+            </a:ln>
+          </p:spPr>
+          <p:style>
+            <a:lnRef idx="1">
+              <a:schemeClr val="accent1"/>
+            </a:lnRef>
+            <a:fillRef idx="0">
+              <a:schemeClr val="accent1"/>
+            </a:fillRef>
+            <a:effectRef idx="0">
+              <a:schemeClr val="accent1"/>
+            </a:effectRef>
+            <a:fontRef idx="minor">
+              <a:schemeClr val="tx1"/>
+            </a:fontRef>
+          </p:style>
+        </p:cxnSp>
+        <p:sp>
+          <p:nvSpPr>
+            <p:cNvPr id="37" name="Rectangle 36"/>
+            <p:cNvSpPr/>
+            <p:nvPr/>
+          </p:nvSpPr>
+          <p:spPr>
+            <a:xfrm>
+              <a:off x="7744911" y="1906019"/>
+              <a:ext cx="722081" cy="516095"/>
+            </a:xfrm>
+            <a:prstGeom prst="rect">
+              <a:avLst/>
+            </a:prstGeom>
+            <a:noFill/>
+            <a:ln w="38100">
+              <a:solidFill>
+                <a:srgbClr val="00B050"/>
+              </a:solidFill>
+            </a:ln>
+          </p:spPr>
+          <p:style>
+            <a:lnRef idx="2">
+              <a:schemeClr val="accent1">
+                <a:shade val="50000"/>
+              </a:schemeClr>
+            </a:lnRef>
+            <a:fillRef idx="1">
+              <a:schemeClr val="accent1"/>
+            </a:fillRef>
+            <a:effectRef idx="0">
+              <a:schemeClr val="accent1"/>
+            </a:effectRef>
+            <a:fontRef idx="minor">
+              <a:schemeClr val="lt1"/>
+            </a:fontRef>
+          </p:style>
+          <p:txBody>
+            <a:bodyPr rtlCol="0" anchor="ctr"/>
+            <a:lstStyle/>
+            <a:p>
+              <a:pPr algn="ctr"/>
+              <a:endParaRPr lang="en-PH"/>
+            </a:p>
+          </p:txBody>
+        </p:sp>
+        <p:sp>
+          <p:nvSpPr>
+            <p:cNvPr id="40" name="Rectangle 39"/>
+            <p:cNvSpPr/>
+            <p:nvPr/>
+          </p:nvSpPr>
+          <p:spPr>
+            <a:xfrm>
+              <a:off x="8898704" y="1894773"/>
+              <a:ext cx="484403" cy="477454"/>
+            </a:xfrm>
+            <a:prstGeom prst="rect">
+              <a:avLst/>
+            </a:prstGeom>
+            <a:noFill/>
+            <a:ln w="38100">
+              <a:solidFill>
+                <a:srgbClr val="00B050"/>
+              </a:solidFill>
+            </a:ln>
+          </p:spPr>
+          <p:style>
+            <a:lnRef idx="2">
+              <a:schemeClr val="accent1">
+                <a:shade val="50000"/>
+              </a:schemeClr>
+            </a:lnRef>
+            <a:fillRef idx="1">
+              <a:schemeClr val="accent1"/>
+            </a:fillRef>
+            <a:effectRef idx="0">
+              <a:schemeClr val="accent1"/>
+            </a:effectRef>
+            <a:fontRef idx="minor">
+              <a:schemeClr val="lt1"/>
+            </a:fontRef>
+          </p:style>
+          <p:txBody>
+            <a:bodyPr rtlCol="0" anchor="ctr"/>
+            <a:lstStyle/>
+            <a:p>
+              <a:pPr algn="ctr"/>
+              <a:endParaRPr lang="en-PH"/>
+            </a:p>
+          </p:txBody>
+        </p:sp>
+        <p:sp>
+          <p:nvSpPr>
+            <p:cNvPr id="41" name="Rectangle 40"/>
+            <p:cNvSpPr/>
+            <p:nvPr/>
+          </p:nvSpPr>
+          <p:spPr>
+            <a:xfrm>
+              <a:off x="9902897" y="1873762"/>
+              <a:ext cx="594979" cy="516095"/>
+            </a:xfrm>
+            <a:prstGeom prst="rect">
+              <a:avLst/>
+            </a:prstGeom>
+            <a:noFill/>
+            <a:ln w="38100">
+              <a:solidFill>
+                <a:srgbClr val="00B050"/>
+              </a:solidFill>
+            </a:ln>
+          </p:spPr>
+          <p:style>
+            <a:lnRef idx="2">
+              <a:schemeClr val="accent1">
+                <a:shade val="50000"/>
+              </a:schemeClr>
+            </a:lnRef>
+            <a:fillRef idx="1">
+              <a:schemeClr val="accent1"/>
+            </a:fillRef>
+            <a:effectRef idx="0">
+              <a:schemeClr val="accent1"/>
+            </a:effectRef>
+            <a:fontRef idx="minor">
+              <a:schemeClr val="lt1"/>
+            </a:fontRef>
+          </p:style>
+          <p:txBody>
+            <a:bodyPr rtlCol="0" anchor="ctr"/>
+            <a:lstStyle/>
+            <a:p>
+              <a:pPr algn="ctr"/>
+              <a:endParaRPr lang="en-PH"/>
+            </a:p>
+          </p:txBody>
+        </p:sp>
+        <p:sp>
+          <p:nvSpPr>
+            <p:cNvPr id="42" name="Rectangle 41"/>
+            <p:cNvSpPr/>
+            <p:nvPr/>
+          </p:nvSpPr>
+          <p:spPr>
+            <a:xfrm>
+              <a:off x="10890564" y="1884205"/>
+              <a:ext cx="701004" cy="516095"/>
+            </a:xfrm>
+            <a:prstGeom prst="rect">
+              <a:avLst/>
+            </a:prstGeom>
+            <a:noFill/>
+            <a:ln w="38100">
+              <a:solidFill>
+                <a:srgbClr val="00B050"/>
+              </a:solidFill>
+            </a:ln>
+          </p:spPr>
+          <p:style>
+            <a:lnRef idx="2">
+              <a:schemeClr val="accent1">
+                <a:shade val="50000"/>
+              </a:schemeClr>
+            </a:lnRef>
+            <a:fillRef idx="1">
+              <a:schemeClr val="accent1"/>
+            </a:fillRef>
+            <a:effectRef idx="0">
+              <a:schemeClr val="accent1"/>
+            </a:effectRef>
+            <a:fontRef idx="minor">
+              <a:schemeClr val="lt1"/>
+            </a:fontRef>
+          </p:style>
+          <p:txBody>
+            <a:bodyPr rtlCol="0" anchor="ctr"/>
+            <a:lstStyle/>
+            <a:p>
+              <a:pPr algn="ctr"/>
+              <a:endParaRPr lang="en-PH"/>
+            </a:p>
+          </p:txBody>
+        </p:sp>
+        <p:cxnSp>
+          <p:nvCxnSpPr>
+            <p:cNvPr id="44" name="Straight Arrow Connector 43"/>
+            <p:cNvCxnSpPr>
+              <a:stCxn id="40" idx="0"/>
+            </p:cNvCxnSpPr>
+            <p:nvPr/>
+          </p:nvCxnSpPr>
+          <p:spPr>
+            <a:xfrm flipH="1" flipV="1">
+              <a:off x="8629378" y="1718494"/>
+              <a:ext cx="511528" cy="176279"/>
+            </a:xfrm>
+            <a:prstGeom prst="straightConnector1">
+              <a:avLst/>
+            </a:prstGeom>
+            <a:ln w="19050">
+              <a:solidFill>
+                <a:srgbClr val="00B050"/>
+              </a:solidFill>
+              <a:tailEnd type="triangle"/>
+            </a:ln>
+          </p:spPr>
+          <p:style>
+            <a:lnRef idx="1">
+              <a:schemeClr val="accent1"/>
+            </a:lnRef>
+            <a:fillRef idx="0">
+              <a:schemeClr val="accent1"/>
+            </a:fillRef>
+            <a:effectRef idx="0">
+              <a:schemeClr val="accent1"/>
+            </a:effectRef>
+            <a:fontRef idx="minor">
+              <a:schemeClr val="tx1"/>
+            </a:fontRef>
+          </p:style>
+        </p:cxnSp>
+        <p:cxnSp>
+          <p:nvCxnSpPr>
+            <p:cNvPr id="45" name="Straight Arrow Connector 44"/>
+            <p:cNvCxnSpPr>
+              <a:stCxn id="41" idx="0"/>
+            </p:cNvCxnSpPr>
+            <p:nvPr/>
+          </p:nvCxnSpPr>
+          <p:spPr>
+            <a:xfrm flipH="1" flipV="1">
+              <a:off x="9383107" y="1302996"/>
+              <a:ext cx="817280" cy="570766"/>
+            </a:xfrm>
+            <a:prstGeom prst="straightConnector1">
+              <a:avLst/>
+            </a:prstGeom>
+            <a:ln w="19050">
+              <a:solidFill>
+                <a:srgbClr val="00B050"/>
+              </a:solidFill>
+              <a:tailEnd type="triangle"/>
+            </a:ln>
+          </p:spPr>
+          <p:style>
+            <a:lnRef idx="1">
+              <a:schemeClr val="accent1"/>
+            </a:lnRef>
+            <a:fillRef idx="0">
+              <a:schemeClr val="accent1"/>
+            </a:fillRef>
+            <a:effectRef idx="0">
+              <a:schemeClr val="accent1"/>
+            </a:effectRef>
+            <a:fontRef idx="minor">
+              <a:schemeClr val="tx1"/>
+            </a:fontRef>
+          </p:style>
+        </p:cxnSp>
+        <p:cxnSp>
+          <p:nvCxnSpPr>
+            <p:cNvPr id="46" name="Straight Arrow Connector 45"/>
+            <p:cNvCxnSpPr>
+              <a:stCxn id="42" idx="0"/>
+              <a:endCxn id="17" idx="3"/>
+            </p:cNvCxnSpPr>
+            <p:nvPr/>
+          </p:nvCxnSpPr>
+          <p:spPr>
+            <a:xfrm flipH="1" flipV="1">
+              <a:off x="9383107" y="1302996"/>
+              <a:ext cx="1857959" cy="581209"/>
+            </a:xfrm>
+            <a:prstGeom prst="straightConnector1">
+              <a:avLst/>
+            </a:prstGeom>
+            <a:ln w="19050">
+              <a:solidFill>
+                <a:srgbClr val="00B050"/>
+              </a:solidFill>
+              <a:tailEnd type="triangle"/>
+            </a:ln>
+          </p:spPr>
+          <p:style>
+            <a:lnRef idx="1">
+              <a:schemeClr val="accent1"/>
+            </a:lnRef>
+            <a:fillRef idx="0">
+              <a:schemeClr val="accent1"/>
+            </a:fillRef>
+            <a:effectRef idx="0">
+              <a:schemeClr val="accent1"/>
+            </a:effectRef>
+            <a:fontRef idx="minor">
+              <a:schemeClr val="tx1"/>
+            </a:fontRef>
+          </p:style>
+        </p:cxnSp>
+        <p:sp>
+          <p:nvSpPr>
+            <p:cNvPr id="54" name="Rectangle 53"/>
+            <p:cNvSpPr/>
+            <p:nvPr/>
+          </p:nvSpPr>
+          <p:spPr>
+            <a:xfrm>
+              <a:off x="7616335" y="2607696"/>
+              <a:ext cx="979231" cy="627873"/>
+            </a:xfrm>
+            <a:prstGeom prst="rect">
+              <a:avLst/>
+            </a:prstGeom>
+            <a:noFill/>
+            <a:ln w="28575">
+              <a:solidFill>
+                <a:srgbClr val="00B0F0"/>
+              </a:solidFill>
+            </a:ln>
+          </p:spPr>
+          <p:style>
+            <a:lnRef idx="2">
+              <a:schemeClr val="accent1">
+                <a:shade val="50000"/>
+              </a:schemeClr>
+            </a:lnRef>
+            <a:fillRef idx="1">
+              <a:schemeClr val="accent1"/>
+            </a:fillRef>
+            <a:effectRef idx="0">
+              <a:schemeClr val="accent1"/>
+            </a:effectRef>
+            <a:fontRef idx="minor">
+              <a:schemeClr val="lt1"/>
+            </a:fontRef>
+          </p:style>
+          <p:txBody>
+            <a:bodyPr rtlCol="0" anchor="ctr"/>
+            <a:lstStyle/>
+            <a:p>
+              <a:pPr algn="ctr"/>
+              <a:endParaRPr lang="en-PH"/>
+            </a:p>
+          </p:txBody>
+        </p:sp>
+        <p:sp>
+          <p:nvSpPr>
+            <p:cNvPr id="55" name="Rectangle 54"/>
+            <p:cNvSpPr/>
+            <p:nvPr/>
+          </p:nvSpPr>
+          <p:spPr>
+            <a:xfrm>
+              <a:off x="8651289" y="2607696"/>
+              <a:ext cx="979231" cy="627873"/>
+            </a:xfrm>
+            <a:prstGeom prst="rect">
+              <a:avLst/>
+            </a:prstGeom>
+            <a:noFill/>
+            <a:ln w="28575">
+              <a:solidFill>
+                <a:srgbClr val="00B0F0"/>
+              </a:solidFill>
+            </a:ln>
+          </p:spPr>
+          <p:style>
+            <a:lnRef idx="2">
+              <a:schemeClr val="accent1">
+                <a:shade val="50000"/>
+              </a:schemeClr>
+            </a:lnRef>
+            <a:fillRef idx="1">
+              <a:schemeClr val="accent1"/>
+            </a:fillRef>
+            <a:effectRef idx="0">
+              <a:schemeClr val="accent1"/>
+            </a:effectRef>
+            <a:fontRef idx="minor">
+              <a:schemeClr val="lt1"/>
+            </a:fontRef>
+          </p:style>
+          <p:txBody>
+            <a:bodyPr rtlCol="0" anchor="ctr"/>
+            <a:lstStyle/>
+            <a:p>
+              <a:pPr algn="ctr"/>
+              <a:endParaRPr lang="en-PH"/>
+            </a:p>
+          </p:txBody>
+        </p:sp>
+        <p:sp>
+          <p:nvSpPr>
+            <p:cNvPr id="56" name="Rectangle 55"/>
+            <p:cNvSpPr/>
+            <p:nvPr/>
+          </p:nvSpPr>
+          <p:spPr>
+            <a:xfrm>
+              <a:off x="9731324" y="2607695"/>
+              <a:ext cx="979231" cy="627873"/>
+            </a:xfrm>
+            <a:prstGeom prst="rect">
+              <a:avLst/>
+            </a:prstGeom>
+            <a:noFill/>
+            <a:ln w="28575">
+              <a:solidFill>
+                <a:srgbClr val="00B0F0"/>
+              </a:solidFill>
+            </a:ln>
+          </p:spPr>
+          <p:style>
+            <a:lnRef idx="2">
+              <a:schemeClr val="accent1">
+                <a:shade val="50000"/>
+              </a:schemeClr>
+            </a:lnRef>
+            <a:fillRef idx="1">
+              <a:schemeClr val="accent1"/>
+            </a:fillRef>
+            <a:effectRef idx="0">
+              <a:schemeClr val="accent1"/>
+            </a:effectRef>
+            <a:fontRef idx="minor">
+              <a:schemeClr val="lt1"/>
+            </a:fontRef>
+          </p:style>
+          <p:txBody>
+            <a:bodyPr rtlCol="0" anchor="ctr"/>
+            <a:lstStyle/>
+            <a:p>
+              <a:pPr algn="ctr"/>
+              <a:endParaRPr lang="en-PH"/>
+            </a:p>
+          </p:txBody>
+        </p:sp>
+        <p:sp>
+          <p:nvSpPr>
+            <p:cNvPr id="57" name="Rectangle 56"/>
+            <p:cNvSpPr/>
+            <p:nvPr/>
+          </p:nvSpPr>
+          <p:spPr>
+            <a:xfrm>
+              <a:off x="10730586" y="2607694"/>
+              <a:ext cx="979231" cy="627873"/>
+            </a:xfrm>
+            <a:prstGeom prst="rect">
+              <a:avLst/>
+            </a:prstGeom>
+            <a:noFill/>
+            <a:ln w="28575">
+              <a:solidFill>
+                <a:srgbClr val="00B0F0"/>
+              </a:solidFill>
+            </a:ln>
+          </p:spPr>
+          <p:style>
+            <a:lnRef idx="2">
+              <a:schemeClr val="accent1">
+                <a:shade val="50000"/>
+              </a:schemeClr>
+            </a:lnRef>
+            <a:fillRef idx="1">
+              <a:schemeClr val="accent1"/>
+            </a:fillRef>
+            <a:effectRef idx="0">
+              <a:schemeClr val="accent1"/>
+            </a:effectRef>
+            <a:fontRef idx="minor">
+              <a:schemeClr val="lt1"/>
+            </a:fontRef>
+          </p:style>
+          <p:txBody>
+            <a:bodyPr rtlCol="0" anchor="ctr"/>
+            <a:lstStyle/>
+            <a:p>
+              <a:pPr algn="ctr"/>
+              <a:endParaRPr lang="en-PH"/>
+            </a:p>
+          </p:txBody>
+        </p:sp>
+        <p:cxnSp>
+          <p:nvCxnSpPr>
+            <p:cNvPr id="62" name="Straight Connector 61"/>
+            <p:cNvCxnSpPr/>
+            <p:nvPr/>
+          </p:nvCxnSpPr>
+          <p:spPr>
+            <a:xfrm>
+              <a:off x="6998677" y="2513270"/>
+              <a:ext cx="4308231" cy="22182"/>
+            </a:xfrm>
+            <a:prstGeom prst="line">
+              <a:avLst/>
+            </a:prstGeom>
+            <a:ln w="28575">
+              <a:solidFill>
+                <a:srgbClr val="00B0F0"/>
+              </a:solidFill>
+            </a:ln>
+          </p:spPr>
+          <p:style>
+            <a:lnRef idx="1">
+              <a:schemeClr val="accent1"/>
+            </a:lnRef>
+            <a:fillRef idx="0">
+              <a:schemeClr val="accent1"/>
+            </a:fillRef>
+            <a:effectRef idx="0">
+              <a:schemeClr val="accent1"/>
+            </a:effectRef>
+            <a:fontRef idx="minor">
+              <a:schemeClr val="tx1"/>
+            </a:fontRef>
+          </p:style>
+        </p:cxnSp>
+        <p:cxnSp>
+          <p:nvCxnSpPr>
+            <p:cNvPr id="67" name="Straight Connector 66"/>
+            <p:cNvCxnSpPr/>
+            <p:nvPr/>
+          </p:nvCxnSpPr>
+          <p:spPr>
+            <a:xfrm>
+              <a:off x="7007469" y="2517868"/>
+              <a:ext cx="0" cy="108000"/>
+            </a:xfrm>
+            <a:prstGeom prst="line">
+              <a:avLst/>
+            </a:prstGeom>
+            <a:ln w="19050">
+              <a:solidFill>
+                <a:srgbClr val="00B0F0"/>
+              </a:solidFill>
+            </a:ln>
+          </p:spPr>
+          <p:style>
+            <a:lnRef idx="1">
+              <a:schemeClr val="accent1"/>
+            </a:lnRef>
+            <a:fillRef idx="0">
+              <a:schemeClr val="accent1"/>
+            </a:fillRef>
+            <a:effectRef idx="0">
+              <a:schemeClr val="accent1"/>
+            </a:effectRef>
+            <a:fontRef idx="minor">
+              <a:schemeClr val="tx1"/>
+            </a:fontRef>
+          </p:style>
+        </p:cxnSp>
+        <p:cxnSp>
+          <p:nvCxnSpPr>
+            <p:cNvPr id="68" name="Straight Connector 67"/>
+            <p:cNvCxnSpPr/>
+            <p:nvPr/>
+          </p:nvCxnSpPr>
+          <p:spPr>
+            <a:xfrm>
+              <a:off x="8118231" y="2512008"/>
+              <a:ext cx="0" cy="108000"/>
+            </a:xfrm>
+            <a:prstGeom prst="line">
+              <a:avLst/>
+            </a:prstGeom>
+            <a:ln w="19050">
+              <a:solidFill>
+                <a:srgbClr val="00B0F0"/>
+              </a:solidFill>
+            </a:ln>
+          </p:spPr>
+          <p:style>
+            <a:lnRef idx="1">
+              <a:schemeClr val="accent1"/>
+            </a:lnRef>
+            <a:fillRef idx="0">
+              <a:schemeClr val="accent1"/>
+            </a:fillRef>
+            <a:effectRef idx="0">
+              <a:schemeClr val="accent1"/>
+            </a:effectRef>
+            <a:fontRef idx="minor">
+              <a:schemeClr val="tx1"/>
+            </a:fontRef>
+          </p:style>
+        </p:cxnSp>
+        <p:cxnSp>
+          <p:nvCxnSpPr>
+            <p:cNvPr id="69" name="Straight Connector 68"/>
+            <p:cNvCxnSpPr/>
+            <p:nvPr/>
+          </p:nvCxnSpPr>
+          <p:spPr>
+            <a:xfrm>
+              <a:off x="9141070" y="2523734"/>
+              <a:ext cx="0" cy="108000"/>
+            </a:xfrm>
+            <a:prstGeom prst="line">
+              <a:avLst/>
+            </a:prstGeom>
+            <a:ln w="19050">
+              <a:solidFill>
+                <a:srgbClr val="00B0F0"/>
+              </a:solidFill>
+            </a:ln>
+          </p:spPr>
+          <p:style>
+            <a:lnRef idx="1">
+              <a:schemeClr val="accent1"/>
+            </a:lnRef>
+            <a:fillRef idx="0">
+              <a:schemeClr val="accent1"/>
+            </a:fillRef>
+            <a:effectRef idx="0">
+              <a:schemeClr val="accent1"/>
+            </a:effectRef>
+            <a:fontRef idx="minor">
+              <a:schemeClr val="tx1"/>
+            </a:fontRef>
+          </p:style>
+        </p:cxnSp>
+        <p:cxnSp>
+          <p:nvCxnSpPr>
+            <p:cNvPr id="70" name="Straight Connector 69"/>
+            <p:cNvCxnSpPr/>
+            <p:nvPr/>
+          </p:nvCxnSpPr>
+          <p:spPr>
+            <a:xfrm>
+              <a:off x="10225454" y="2544252"/>
+              <a:ext cx="0" cy="108000"/>
+            </a:xfrm>
+            <a:prstGeom prst="line">
+              <a:avLst/>
+            </a:prstGeom>
+            <a:ln w="19050">
+              <a:solidFill>
+                <a:srgbClr val="00B0F0"/>
+              </a:solidFill>
+            </a:ln>
+          </p:spPr>
+          <p:style>
+            <a:lnRef idx="1">
+              <a:schemeClr val="accent1"/>
+            </a:lnRef>
+            <a:fillRef idx="0">
+              <a:schemeClr val="accent1"/>
+            </a:fillRef>
+            <a:effectRef idx="0">
+              <a:schemeClr val="accent1"/>
+            </a:effectRef>
+            <a:fontRef idx="minor">
+              <a:schemeClr val="tx1"/>
+            </a:fontRef>
+          </p:style>
+        </p:cxnSp>
+        <p:cxnSp>
+          <p:nvCxnSpPr>
+            <p:cNvPr id="71" name="Straight Connector 70"/>
+            <p:cNvCxnSpPr/>
+            <p:nvPr/>
+          </p:nvCxnSpPr>
+          <p:spPr>
+            <a:xfrm>
+              <a:off x="11336217" y="2529601"/>
+              <a:ext cx="0" cy="108000"/>
+            </a:xfrm>
+            <a:prstGeom prst="line">
+              <a:avLst/>
+            </a:prstGeom>
+            <a:ln w="19050">
+              <a:solidFill>
+                <a:srgbClr val="00B0F0"/>
+              </a:solidFill>
+            </a:ln>
+          </p:spPr>
+          <p:style>
+            <a:lnRef idx="1">
+              <a:schemeClr val="accent1"/>
+            </a:lnRef>
+            <a:fillRef idx="0">
+              <a:schemeClr val="accent1"/>
+            </a:fillRef>
+            <a:effectRef idx="0">
+              <a:schemeClr val="accent1"/>
+            </a:effectRef>
+            <a:fontRef idx="minor">
+              <a:schemeClr val="tx1"/>
+            </a:fontRef>
+          </p:style>
+        </p:cxnSp>
+      </p:grpSp>
+    </p:spTree>
+    <p:extLst>
+      <p:ext uri="{BB962C8B-B14F-4D97-AF65-F5344CB8AC3E}">
+        <p14:creationId xmlns:p14="http://schemas.microsoft.com/office/powerpoint/2010/main" val="1907412348"/>
+      </p:ext>
+    </p:extLst>
+  </p:cSld>
+  <p:clrMapOvr>
+    <a:masterClrMapping/>
+  </p:clrMapOvr>
+</p:sld>
+</file>
+
+<file path=ppt/slides/slide11.xml><?xml version="1.0" encoding="utf-8"?>
+<p:sld xmlns:a="http://schemas.openxmlformats.org/drawingml/2006/main" xmlns:r="http://schemas.openxmlformats.org/officeDocument/2006/relationships" xmlns:p="http://schemas.openxmlformats.org/presentationml/2006/main">
+  <p:cSld>
+    <p:spTree>
+      <p:nvGrpSpPr>
+        <p:cNvPr id="1" name=""/>
+        <p:cNvGrpSpPr/>
+        <p:nvPr/>
+      </p:nvGrpSpPr>
+      <p:grpSpPr>
+        <a:xfrm>
+          <a:off x="0" y="0"/>
+          <a:ext cx="0" cy="0"/>
+          <a:chOff x="0" y="0"/>
+          <a:chExt cx="0" cy="0"/>
+        </a:xfrm>
+      </p:grpSpPr>
+      <p:grpSp>
+        <p:nvGrpSpPr>
+          <p:cNvPr id="54" name="Group 53"/>
+          <p:cNvGrpSpPr/>
+          <p:nvPr/>
+        </p:nvGrpSpPr>
+        <p:grpSpPr>
+          <a:xfrm>
+            <a:off x="578001" y="743315"/>
+            <a:ext cx="11160000" cy="5076174"/>
+            <a:chOff x="578001" y="743315"/>
+            <a:chExt cx="11160000" cy="5076174"/>
+          </a:xfrm>
+        </p:grpSpPr>
+        <p:pic>
+          <p:nvPicPr>
+            <p:cNvPr id="2" name="Picture 1"/>
+            <p:cNvPicPr>
+              <a:picLocks noChangeAspect="1"/>
+            </p:cNvPicPr>
+            <p:nvPr/>
+          </p:nvPicPr>
+          <p:blipFill>
+            <a:blip r:embed="rId2"/>
+            <a:stretch>
+              <a:fillRect/>
+            </a:stretch>
+          </p:blipFill>
+          <p:spPr>
+            <a:xfrm>
+              <a:off x="578001" y="743315"/>
+              <a:ext cx="11160000" cy="5067433"/>
+            </a:xfrm>
+            <a:prstGeom prst="rect">
+              <a:avLst/>
+            </a:prstGeom>
+          </p:spPr>
+        </p:pic>
+        <p:cxnSp>
+          <p:nvCxnSpPr>
+            <p:cNvPr id="3" name="Straight Arrow Connector 2"/>
+            <p:cNvCxnSpPr>
+              <a:stCxn id="10" idx="1"/>
+              <a:endCxn id="5" idx="3"/>
+            </p:cNvCxnSpPr>
+            <p:nvPr/>
+          </p:nvCxnSpPr>
+          <p:spPr>
+            <a:xfrm flipH="1">
+              <a:off x="3076486" y="2404902"/>
+              <a:ext cx="1070447" cy="732603"/>
+            </a:xfrm>
+            <a:prstGeom prst="straightConnector1">
+              <a:avLst/>
+            </a:prstGeom>
+            <a:ln>
+              <a:solidFill>
+                <a:srgbClr val="00B0F0"/>
+              </a:solidFill>
+              <a:tailEnd type="triangle"/>
+            </a:ln>
+          </p:spPr>
+          <p:style>
+            <a:lnRef idx="1">
+              <a:schemeClr val="accent1"/>
+            </a:lnRef>
+            <a:fillRef idx="0">
+              <a:schemeClr val="accent1"/>
+            </a:fillRef>
+            <a:effectRef idx="0">
+              <a:schemeClr val="accent1"/>
+            </a:effectRef>
+            <a:fontRef idx="minor">
+              <a:schemeClr val="tx1"/>
+            </a:fontRef>
+          </p:style>
+        </p:cxnSp>
+        <p:cxnSp>
+          <p:nvCxnSpPr>
+            <p:cNvPr id="4" name="Straight Arrow Connector 3"/>
+            <p:cNvCxnSpPr>
+              <a:stCxn id="7" idx="1"/>
+              <a:endCxn id="5" idx="3"/>
+            </p:cNvCxnSpPr>
+            <p:nvPr/>
+          </p:nvCxnSpPr>
+          <p:spPr>
+            <a:xfrm flipH="1">
+              <a:off x="3076486" y="2431136"/>
+              <a:ext cx="589660" cy="706369"/>
+            </a:xfrm>
+            <a:prstGeom prst="straightConnector1">
+              <a:avLst/>
+            </a:prstGeom>
+            <a:ln w="19050">
+              <a:solidFill>
+                <a:srgbClr val="00B050"/>
+              </a:solidFill>
+              <a:tailEnd type="triangle"/>
+            </a:ln>
+          </p:spPr>
+          <p:style>
+            <a:lnRef idx="1">
+              <a:schemeClr val="accent1"/>
+            </a:lnRef>
+            <a:fillRef idx="0">
+              <a:schemeClr val="accent1"/>
+            </a:fillRef>
+            <a:effectRef idx="0">
+              <a:schemeClr val="accent1"/>
+            </a:effectRef>
+            <a:fontRef idx="minor">
+              <a:schemeClr val="tx1"/>
+            </a:fontRef>
+          </p:style>
+        </p:cxnSp>
+        <p:sp>
+          <p:nvSpPr>
+            <p:cNvPr id="5" name="TextBox 4"/>
+            <p:cNvSpPr txBox="1"/>
+            <p:nvPr/>
+          </p:nvSpPr>
+          <p:spPr>
+            <a:xfrm>
+              <a:off x="1569029" y="2722006"/>
+              <a:ext cx="1507457" cy="830997"/>
+            </a:xfrm>
+            <a:prstGeom prst="rect">
+              <a:avLst/>
+            </a:prstGeom>
+            <a:solidFill>
+              <a:schemeClr val="accent3">
+                <a:lumMod val="20000"/>
+                <a:lumOff val="80000"/>
+              </a:schemeClr>
+            </a:solidFill>
+          </p:spPr>
+          <p:txBody>
+            <a:bodyPr wrap="square" rtlCol="0">
+              <a:spAutoFit/>
+            </a:bodyPr>
+            <a:lstStyle/>
+            <a:p>
+              <a:pPr algn="ctr"/>
+              <a:r>
+                <a:rPr lang="en-US" sz="1600" dirty="0" smtClean="0">
+                  <a:solidFill>
+                    <a:srgbClr val="00B050"/>
+                  </a:solidFill>
+                </a:rPr>
+                <a:t>Images </a:t>
+              </a:r>
+              <a:r>
+                <a:rPr lang="en-US" sz="1600" dirty="0" smtClean="0"/>
+                <a:t>and </a:t>
+              </a:r>
+              <a:r>
+                <a:rPr lang="en-US" sz="1600" dirty="0" smtClean="0">
+                  <a:solidFill>
+                    <a:srgbClr val="00B0F0"/>
+                  </a:solidFill>
+                </a:rPr>
+                <a:t>texts </a:t>
+              </a:r>
+              <a:r>
+                <a:rPr lang="en-US" sz="1600" dirty="0" smtClean="0"/>
+                <a:t>to be extracted…</a:t>
+              </a:r>
+              <a:endParaRPr lang="en-PH" sz="1600" dirty="0">
+                <a:solidFill>
+                  <a:srgbClr val="00B050"/>
+                </a:solidFill>
+              </a:endParaRPr>
+            </a:p>
+          </p:txBody>
+        </p:sp>
+        <p:sp>
+          <p:nvSpPr>
+            <p:cNvPr id="7" name="Rectangle 6"/>
+            <p:cNvSpPr/>
+            <p:nvPr/>
+          </p:nvSpPr>
+          <p:spPr>
+            <a:xfrm>
+              <a:off x="3666146" y="2187437"/>
+              <a:ext cx="435835" cy="487397"/>
+            </a:xfrm>
+            <a:prstGeom prst="rect">
+              <a:avLst/>
+            </a:prstGeom>
+            <a:noFill/>
+            <a:ln w="38100">
+              <a:solidFill>
+                <a:srgbClr val="00B050"/>
+              </a:solidFill>
+            </a:ln>
+          </p:spPr>
+          <p:style>
+            <a:lnRef idx="2">
+              <a:schemeClr val="accent1">
+                <a:shade val="50000"/>
+              </a:schemeClr>
+            </a:lnRef>
+            <a:fillRef idx="1">
+              <a:schemeClr val="accent1"/>
+            </a:fillRef>
+            <a:effectRef idx="0">
+              <a:schemeClr val="accent1"/>
+            </a:effectRef>
+            <a:fontRef idx="minor">
+              <a:schemeClr val="lt1"/>
+            </a:fontRef>
+          </p:style>
+          <p:txBody>
+            <a:bodyPr rtlCol="0" anchor="ctr"/>
+            <a:lstStyle/>
+            <a:p>
+              <a:pPr algn="ctr"/>
+              <a:endParaRPr lang="en-PH"/>
+            </a:p>
+          </p:txBody>
+        </p:sp>
+        <p:cxnSp>
+          <p:nvCxnSpPr>
+            <p:cNvPr id="9" name="Straight Arrow Connector 8"/>
+            <p:cNvCxnSpPr/>
+            <p:nvPr/>
+          </p:nvCxnSpPr>
+          <p:spPr>
+            <a:xfrm flipH="1" flipV="1">
+              <a:off x="3071585" y="3152871"/>
+              <a:ext cx="1075348" cy="787649"/>
+            </a:xfrm>
+            <a:prstGeom prst="straightConnector1">
+              <a:avLst/>
+            </a:prstGeom>
+            <a:ln>
+              <a:solidFill>
+                <a:srgbClr val="00B0F0"/>
+              </a:solidFill>
+              <a:tailEnd type="triangle"/>
+            </a:ln>
+          </p:spPr>
+          <p:style>
+            <a:lnRef idx="1">
+              <a:schemeClr val="accent1"/>
+            </a:lnRef>
+            <a:fillRef idx="0">
+              <a:schemeClr val="accent1"/>
+            </a:fillRef>
+            <a:effectRef idx="0">
+              <a:schemeClr val="accent1"/>
+            </a:effectRef>
+            <a:fontRef idx="minor">
+              <a:schemeClr val="tx1"/>
+            </a:fontRef>
+          </p:style>
+        </p:cxnSp>
+        <p:sp>
+          <p:nvSpPr>
+            <p:cNvPr id="10" name="Rectangle 9"/>
+            <p:cNvSpPr/>
+            <p:nvPr/>
+          </p:nvSpPr>
+          <p:spPr>
+            <a:xfrm>
+              <a:off x="4146933" y="2237520"/>
+              <a:ext cx="4099757" cy="334763"/>
+            </a:xfrm>
+            <a:prstGeom prst="rect">
+              <a:avLst/>
+            </a:prstGeom>
+            <a:noFill/>
+            <a:ln w="28575">
+              <a:solidFill>
+                <a:srgbClr val="00B0F0"/>
+              </a:solidFill>
+            </a:ln>
+          </p:spPr>
+          <p:style>
+            <a:lnRef idx="2">
+              <a:schemeClr val="accent1">
+                <a:shade val="50000"/>
+              </a:schemeClr>
+            </a:lnRef>
+            <a:fillRef idx="1">
+              <a:schemeClr val="accent1"/>
+            </a:fillRef>
+            <a:effectRef idx="0">
+              <a:schemeClr val="accent1"/>
+            </a:effectRef>
+            <a:fontRef idx="minor">
+              <a:schemeClr val="lt1"/>
+            </a:fontRef>
+          </p:style>
+          <p:txBody>
+            <a:bodyPr rtlCol="0" anchor="ctr"/>
+            <a:lstStyle/>
+            <a:p>
+              <a:pPr algn="ctr"/>
+              <a:endParaRPr lang="en-PH"/>
+            </a:p>
+          </p:txBody>
+        </p:sp>
+        <p:sp>
+          <p:nvSpPr>
+            <p:cNvPr id="19" name="Rectangle 18"/>
+            <p:cNvSpPr/>
+            <p:nvPr/>
+          </p:nvSpPr>
+          <p:spPr>
+            <a:xfrm>
+              <a:off x="3674692" y="3016190"/>
+              <a:ext cx="435835" cy="453403"/>
+            </a:xfrm>
+            <a:prstGeom prst="rect">
+              <a:avLst/>
+            </a:prstGeom>
+            <a:noFill/>
+            <a:ln w="38100">
+              <a:solidFill>
+                <a:srgbClr val="00B050"/>
+              </a:solidFill>
+            </a:ln>
+          </p:spPr>
+          <p:style>
+            <a:lnRef idx="2">
+              <a:schemeClr val="accent1">
+                <a:shade val="50000"/>
+              </a:schemeClr>
+            </a:lnRef>
+            <a:fillRef idx="1">
+              <a:schemeClr val="accent1"/>
+            </a:fillRef>
+            <a:effectRef idx="0">
+              <a:schemeClr val="accent1"/>
+            </a:effectRef>
+            <a:fontRef idx="minor">
+              <a:schemeClr val="lt1"/>
+            </a:fontRef>
+          </p:style>
+          <p:txBody>
+            <a:bodyPr rtlCol="0" anchor="ctr"/>
+            <a:lstStyle/>
+            <a:p>
+              <a:pPr algn="ctr"/>
+              <a:endParaRPr lang="en-PH"/>
+            </a:p>
+          </p:txBody>
+        </p:sp>
+        <p:sp>
+          <p:nvSpPr>
+            <p:cNvPr id="20" name="Rectangle 19"/>
+            <p:cNvSpPr/>
+            <p:nvPr/>
+          </p:nvSpPr>
+          <p:spPr>
+            <a:xfrm>
+              <a:off x="3674691" y="3802403"/>
+              <a:ext cx="435835" cy="453403"/>
+            </a:xfrm>
+            <a:prstGeom prst="rect">
+              <a:avLst/>
+            </a:prstGeom>
+            <a:noFill/>
+            <a:ln w="38100">
+              <a:solidFill>
+                <a:srgbClr val="00B050"/>
+              </a:solidFill>
+            </a:ln>
+          </p:spPr>
+          <p:style>
+            <a:lnRef idx="2">
+              <a:schemeClr val="accent1">
+                <a:shade val="50000"/>
+              </a:schemeClr>
+            </a:lnRef>
+            <a:fillRef idx="1">
+              <a:schemeClr val="accent1"/>
+            </a:fillRef>
+            <a:effectRef idx="0">
+              <a:schemeClr val="accent1"/>
+            </a:effectRef>
+            <a:fontRef idx="minor">
+              <a:schemeClr val="lt1"/>
+            </a:fontRef>
+          </p:style>
+          <p:txBody>
+            <a:bodyPr rtlCol="0" anchor="ctr"/>
+            <a:lstStyle/>
+            <a:p>
+              <a:pPr algn="ctr"/>
+              <a:endParaRPr lang="en-PH"/>
+            </a:p>
+          </p:txBody>
+        </p:sp>
+        <p:sp>
+          <p:nvSpPr>
+            <p:cNvPr id="21" name="Rectangle 20"/>
+            <p:cNvSpPr/>
+            <p:nvPr/>
+          </p:nvSpPr>
+          <p:spPr>
+            <a:xfrm>
+              <a:off x="3685226" y="4579873"/>
+              <a:ext cx="435835" cy="453403"/>
+            </a:xfrm>
+            <a:prstGeom prst="rect">
+              <a:avLst/>
+            </a:prstGeom>
+            <a:noFill/>
+            <a:ln w="38100">
+              <a:solidFill>
+                <a:srgbClr val="00B050"/>
+              </a:solidFill>
+            </a:ln>
+          </p:spPr>
+          <p:style>
+            <a:lnRef idx="2">
+              <a:schemeClr val="accent1">
+                <a:shade val="50000"/>
+              </a:schemeClr>
+            </a:lnRef>
+            <a:fillRef idx="1">
+              <a:schemeClr val="accent1"/>
+            </a:fillRef>
+            <a:effectRef idx="0">
+              <a:schemeClr val="accent1"/>
+            </a:effectRef>
+            <a:fontRef idx="minor">
+              <a:schemeClr val="lt1"/>
+            </a:fontRef>
+          </p:style>
+          <p:txBody>
+            <a:bodyPr rtlCol="0" anchor="ctr"/>
+            <a:lstStyle/>
+            <a:p>
+              <a:pPr algn="ctr"/>
+              <a:endParaRPr lang="en-PH"/>
+            </a:p>
+          </p:txBody>
+        </p:sp>
+        <p:sp>
+          <p:nvSpPr>
+            <p:cNvPr id="22" name="Rectangle 21"/>
+            <p:cNvSpPr/>
+            <p:nvPr/>
+          </p:nvSpPr>
+          <p:spPr>
+            <a:xfrm>
+              <a:off x="3685226" y="5366086"/>
+              <a:ext cx="435835" cy="453403"/>
+            </a:xfrm>
+            <a:prstGeom prst="rect">
+              <a:avLst/>
+            </a:prstGeom>
+            <a:noFill/>
+            <a:ln w="38100">
+              <a:solidFill>
+                <a:srgbClr val="00B050"/>
+              </a:solidFill>
+            </a:ln>
+          </p:spPr>
+          <p:style>
+            <a:lnRef idx="2">
+              <a:schemeClr val="accent1">
+                <a:shade val="50000"/>
+              </a:schemeClr>
+            </a:lnRef>
+            <a:fillRef idx="1">
+              <a:schemeClr val="accent1"/>
+            </a:fillRef>
+            <a:effectRef idx="0">
+              <a:schemeClr val="accent1"/>
+            </a:effectRef>
+            <a:fontRef idx="minor">
+              <a:schemeClr val="lt1"/>
+            </a:fontRef>
+          </p:style>
+          <p:txBody>
+            <a:bodyPr rtlCol="0" anchor="ctr"/>
+            <a:lstStyle/>
+            <a:p>
+              <a:pPr algn="ctr"/>
+              <a:endParaRPr lang="en-PH"/>
+            </a:p>
+          </p:txBody>
+        </p:sp>
+        <p:cxnSp>
+          <p:nvCxnSpPr>
+            <p:cNvPr id="24" name="Straight Arrow Connector 23"/>
+            <p:cNvCxnSpPr>
+              <a:stCxn id="19" idx="1"/>
+            </p:cNvCxnSpPr>
+            <p:nvPr/>
+          </p:nvCxnSpPr>
+          <p:spPr>
+            <a:xfrm flipH="1" flipV="1">
+              <a:off x="3085032" y="3137504"/>
+              <a:ext cx="589660" cy="105388"/>
+            </a:xfrm>
+            <a:prstGeom prst="straightConnector1">
+              <a:avLst/>
+            </a:prstGeom>
+            <a:ln w="19050">
+              <a:solidFill>
+                <a:srgbClr val="00B050"/>
+              </a:solidFill>
+              <a:tailEnd type="triangle"/>
+            </a:ln>
+          </p:spPr>
+          <p:style>
+            <a:lnRef idx="1">
+              <a:schemeClr val="accent1"/>
+            </a:lnRef>
+            <a:fillRef idx="0">
+              <a:schemeClr val="accent1"/>
+            </a:fillRef>
+            <a:effectRef idx="0">
+              <a:schemeClr val="accent1"/>
+            </a:effectRef>
+            <a:fontRef idx="minor">
+              <a:schemeClr val="tx1"/>
+            </a:fontRef>
+          </p:style>
+        </p:cxnSp>
+        <p:cxnSp>
+          <p:nvCxnSpPr>
+            <p:cNvPr id="27" name="Straight Arrow Connector 26"/>
+            <p:cNvCxnSpPr/>
+            <p:nvPr/>
+          </p:nvCxnSpPr>
+          <p:spPr>
+            <a:xfrm flipH="1" flipV="1">
+              <a:off x="3085032" y="3128764"/>
+              <a:ext cx="581114" cy="900340"/>
+            </a:xfrm>
+            <a:prstGeom prst="straightConnector1">
+              <a:avLst/>
+            </a:prstGeom>
+            <a:ln w="19050">
+              <a:solidFill>
+                <a:srgbClr val="00B050"/>
+              </a:solidFill>
+              <a:tailEnd type="triangle"/>
+            </a:ln>
+          </p:spPr>
+          <p:style>
+            <a:lnRef idx="1">
+              <a:schemeClr val="accent1"/>
+            </a:lnRef>
+            <a:fillRef idx="0">
+              <a:schemeClr val="accent1"/>
+            </a:fillRef>
+            <a:effectRef idx="0">
+              <a:schemeClr val="accent1"/>
+            </a:effectRef>
+            <a:fontRef idx="minor">
+              <a:schemeClr val="tx1"/>
+            </a:fontRef>
+          </p:style>
+        </p:cxnSp>
+        <p:cxnSp>
+          <p:nvCxnSpPr>
+            <p:cNvPr id="30" name="Straight Arrow Connector 29"/>
+            <p:cNvCxnSpPr>
+              <a:stCxn id="21" idx="1"/>
+            </p:cNvCxnSpPr>
+            <p:nvPr/>
+          </p:nvCxnSpPr>
+          <p:spPr>
+            <a:xfrm flipH="1" flipV="1">
+              <a:off x="3085032" y="3146246"/>
+              <a:ext cx="600194" cy="1660329"/>
+            </a:xfrm>
+            <a:prstGeom prst="straightConnector1">
+              <a:avLst/>
+            </a:prstGeom>
+            <a:ln w="19050">
+              <a:solidFill>
+                <a:srgbClr val="00B050"/>
+              </a:solidFill>
+              <a:tailEnd type="triangle"/>
+            </a:ln>
+          </p:spPr>
+          <p:style>
+            <a:lnRef idx="1">
+              <a:schemeClr val="accent1"/>
+            </a:lnRef>
+            <a:fillRef idx="0">
+              <a:schemeClr val="accent1"/>
+            </a:fillRef>
+            <a:effectRef idx="0">
+              <a:schemeClr val="accent1"/>
+            </a:effectRef>
+            <a:fontRef idx="minor">
+              <a:schemeClr val="tx1"/>
+            </a:fontRef>
+          </p:style>
+        </p:cxnSp>
+        <p:cxnSp>
+          <p:nvCxnSpPr>
+            <p:cNvPr id="33" name="Straight Arrow Connector 32"/>
+            <p:cNvCxnSpPr>
+              <a:stCxn id="22" idx="1"/>
+            </p:cNvCxnSpPr>
+            <p:nvPr/>
+          </p:nvCxnSpPr>
+          <p:spPr>
+            <a:xfrm flipH="1" flipV="1">
+              <a:off x="3085032" y="3137504"/>
+              <a:ext cx="600194" cy="2455284"/>
+            </a:xfrm>
+            <a:prstGeom prst="straightConnector1">
+              <a:avLst/>
+            </a:prstGeom>
+            <a:ln w="19050">
+              <a:solidFill>
+                <a:srgbClr val="00B050"/>
+              </a:solidFill>
+              <a:tailEnd type="triangle"/>
+            </a:ln>
+          </p:spPr>
+          <p:style>
+            <a:lnRef idx="1">
+              <a:schemeClr val="accent1"/>
+            </a:lnRef>
+            <a:fillRef idx="0">
+              <a:schemeClr val="accent1"/>
+            </a:fillRef>
+            <a:effectRef idx="0">
+              <a:schemeClr val="accent1"/>
+            </a:effectRef>
+            <a:fontRef idx="minor">
+              <a:schemeClr val="tx1"/>
+            </a:fontRef>
+          </p:style>
+        </p:cxnSp>
+        <p:sp>
+          <p:nvSpPr>
+            <p:cNvPr id="36" name="Rectangle 35"/>
+            <p:cNvSpPr/>
+            <p:nvPr/>
+          </p:nvSpPr>
+          <p:spPr>
+            <a:xfrm>
+              <a:off x="4146933" y="3022816"/>
+              <a:ext cx="4279220" cy="334763"/>
+            </a:xfrm>
+            <a:prstGeom prst="rect">
+              <a:avLst/>
+            </a:prstGeom>
+            <a:noFill/>
+            <a:ln w="28575">
+              <a:solidFill>
+                <a:srgbClr val="00B0F0"/>
+              </a:solidFill>
+            </a:ln>
+          </p:spPr>
+          <p:style>
+            <a:lnRef idx="2">
+              <a:schemeClr val="accent1">
+                <a:shade val="50000"/>
+              </a:schemeClr>
+            </a:lnRef>
+            <a:fillRef idx="1">
+              <a:schemeClr val="accent1"/>
+            </a:fillRef>
+            <a:effectRef idx="0">
+              <a:schemeClr val="accent1"/>
+            </a:effectRef>
+            <a:fontRef idx="minor">
+              <a:schemeClr val="lt1"/>
+            </a:fontRef>
+          </p:style>
+          <p:txBody>
+            <a:bodyPr rtlCol="0" anchor="ctr"/>
+            <a:lstStyle/>
+            <a:p>
+              <a:pPr algn="ctr"/>
+              <a:endParaRPr lang="en-PH"/>
+            </a:p>
+          </p:txBody>
+        </p:sp>
+        <p:sp>
+          <p:nvSpPr>
+            <p:cNvPr id="37" name="Rectangle 36"/>
+            <p:cNvSpPr/>
+            <p:nvPr/>
+          </p:nvSpPr>
+          <p:spPr>
+            <a:xfrm>
+              <a:off x="4146933" y="3809028"/>
+              <a:ext cx="4279220" cy="334763"/>
+            </a:xfrm>
+            <a:prstGeom prst="rect">
+              <a:avLst/>
+            </a:prstGeom>
+            <a:noFill/>
+            <a:ln w="28575">
+              <a:solidFill>
+                <a:srgbClr val="00B0F0"/>
+              </a:solidFill>
+            </a:ln>
+          </p:spPr>
+          <p:style>
+            <a:lnRef idx="2">
+              <a:schemeClr val="accent1">
+                <a:shade val="50000"/>
+              </a:schemeClr>
+            </a:lnRef>
+            <a:fillRef idx="1">
+              <a:schemeClr val="accent1"/>
+            </a:fillRef>
+            <a:effectRef idx="0">
+              <a:schemeClr val="accent1"/>
+            </a:effectRef>
+            <a:fontRef idx="minor">
+              <a:schemeClr val="lt1"/>
+            </a:fontRef>
+          </p:style>
+          <p:txBody>
+            <a:bodyPr rtlCol="0" anchor="ctr"/>
+            <a:lstStyle/>
+            <a:p>
+              <a:pPr algn="ctr"/>
+              <a:endParaRPr lang="en-PH"/>
+            </a:p>
+          </p:txBody>
+        </p:sp>
+        <p:sp>
+          <p:nvSpPr>
+            <p:cNvPr id="38" name="Rectangle 37"/>
+            <p:cNvSpPr/>
+            <p:nvPr/>
+          </p:nvSpPr>
+          <p:spPr>
+            <a:xfrm>
+              <a:off x="4146933" y="4595240"/>
+              <a:ext cx="4279220" cy="334763"/>
+            </a:xfrm>
+            <a:prstGeom prst="rect">
+              <a:avLst/>
+            </a:prstGeom>
+            <a:noFill/>
+            <a:ln w="28575">
+              <a:solidFill>
+                <a:srgbClr val="00B0F0"/>
+              </a:solidFill>
+            </a:ln>
+          </p:spPr>
+          <p:style>
+            <a:lnRef idx="2">
+              <a:schemeClr val="accent1">
+                <a:shade val="50000"/>
+              </a:schemeClr>
+            </a:lnRef>
+            <a:fillRef idx="1">
+              <a:schemeClr val="accent1"/>
+            </a:fillRef>
+            <a:effectRef idx="0">
+              <a:schemeClr val="accent1"/>
+            </a:effectRef>
+            <a:fontRef idx="minor">
+              <a:schemeClr val="lt1"/>
+            </a:fontRef>
+          </p:style>
+          <p:txBody>
+            <a:bodyPr rtlCol="0" anchor="ctr"/>
+            <a:lstStyle/>
+            <a:p>
+              <a:pPr algn="ctr"/>
+              <a:endParaRPr lang="en-PH"/>
+            </a:p>
+          </p:txBody>
+        </p:sp>
+        <p:sp>
+          <p:nvSpPr>
+            <p:cNvPr id="39" name="Rectangle 38"/>
+            <p:cNvSpPr/>
+            <p:nvPr/>
+          </p:nvSpPr>
+          <p:spPr>
+            <a:xfrm>
+              <a:off x="4110526" y="5381452"/>
+              <a:ext cx="4279220" cy="334763"/>
+            </a:xfrm>
+            <a:prstGeom prst="rect">
+              <a:avLst/>
+            </a:prstGeom>
+            <a:noFill/>
+            <a:ln w="28575">
+              <a:solidFill>
+                <a:srgbClr val="00B0F0"/>
+              </a:solidFill>
+            </a:ln>
+          </p:spPr>
+          <p:style>
+            <a:lnRef idx="2">
+              <a:schemeClr val="accent1">
+                <a:shade val="50000"/>
+              </a:schemeClr>
+            </a:lnRef>
+            <a:fillRef idx="1">
+              <a:schemeClr val="accent1"/>
+            </a:fillRef>
+            <a:effectRef idx="0">
+              <a:schemeClr val="accent1"/>
+            </a:effectRef>
+            <a:fontRef idx="minor">
+              <a:schemeClr val="lt1"/>
+            </a:fontRef>
+          </p:style>
+          <p:txBody>
+            <a:bodyPr rtlCol="0" anchor="ctr"/>
+            <a:lstStyle/>
+            <a:p>
+              <a:pPr algn="ctr"/>
+              <a:endParaRPr lang="en-PH"/>
+            </a:p>
+          </p:txBody>
+        </p:sp>
+        <p:cxnSp>
+          <p:nvCxnSpPr>
+            <p:cNvPr id="44" name="Straight Arrow Connector 43"/>
+            <p:cNvCxnSpPr>
+              <a:stCxn id="36" idx="1"/>
+              <a:endCxn id="5" idx="3"/>
+            </p:cNvCxnSpPr>
+            <p:nvPr/>
+          </p:nvCxnSpPr>
+          <p:spPr>
+            <a:xfrm flipH="1" flipV="1">
+              <a:off x="3076486" y="3137505"/>
+              <a:ext cx="1070447" cy="52693"/>
+            </a:xfrm>
+            <a:prstGeom prst="straightConnector1">
+              <a:avLst/>
+            </a:prstGeom>
+            <a:ln>
+              <a:solidFill>
+                <a:srgbClr val="00B0F0"/>
+              </a:solidFill>
+              <a:tailEnd type="triangle"/>
+            </a:ln>
+          </p:spPr>
+          <p:style>
+            <a:lnRef idx="1">
+              <a:schemeClr val="accent1"/>
+            </a:lnRef>
+            <a:fillRef idx="0">
+              <a:schemeClr val="accent1"/>
+            </a:fillRef>
+            <a:effectRef idx="0">
+              <a:schemeClr val="accent1"/>
+            </a:effectRef>
+            <a:fontRef idx="minor">
+              <a:schemeClr val="tx1"/>
+            </a:fontRef>
+          </p:style>
+        </p:cxnSp>
+        <p:cxnSp>
+          <p:nvCxnSpPr>
+            <p:cNvPr id="47" name="Straight Arrow Connector 46"/>
+            <p:cNvCxnSpPr>
+              <a:stCxn id="38" idx="1"/>
+            </p:cNvCxnSpPr>
+            <p:nvPr/>
+          </p:nvCxnSpPr>
+          <p:spPr>
+            <a:xfrm flipH="1" flipV="1">
+              <a:off x="3112893" y="3163052"/>
+              <a:ext cx="1034040" cy="1599570"/>
+            </a:xfrm>
+            <a:prstGeom prst="straightConnector1">
+              <a:avLst/>
+            </a:prstGeom>
+            <a:ln>
+              <a:solidFill>
+                <a:srgbClr val="00B0F0"/>
+              </a:solidFill>
+              <a:tailEnd type="triangle"/>
+            </a:ln>
+          </p:spPr>
+          <p:style>
+            <a:lnRef idx="1">
+              <a:schemeClr val="accent1"/>
+            </a:lnRef>
+            <a:fillRef idx="0">
+              <a:schemeClr val="accent1"/>
+            </a:fillRef>
+            <a:effectRef idx="0">
+              <a:schemeClr val="accent1"/>
+            </a:effectRef>
+            <a:fontRef idx="minor">
+              <a:schemeClr val="tx1"/>
+            </a:fontRef>
+          </p:style>
+        </p:cxnSp>
+        <p:cxnSp>
+          <p:nvCxnSpPr>
+            <p:cNvPr id="51" name="Straight Arrow Connector 50"/>
+            <p:cNvCxnSpPr>
+              <a:stCxn id="39" idx="1"/>
+              <a:endCxn id="5" idx="3"/>
+            </p:cNvCxnSpPr>
+            <p:nvPr/>
+          </p:nvCxnSpPr>
+          <p:spPr>
+            <a:xfrm flipH="1" flipV="1">
+              <a:off x="3076486" y="3137505"/>
+              <a:ext cx="1034040" cy="2411329"/>
+            </a:xfrm>
+            <a:prstGeom prst="straightConnector1">
+              <a:avLst/>
+            </a:prstGeom>
+            <a:ln>
+              <a:solidFill>
+                <a:srgbClr val="00B0F0"/>
+              </a:solidFill>
+              <a:tailEnd type="triangle"/>
+            </a:ln>
+          </p:spPr>
+          <p:style>
+            <a:lnRef idx="1">
+              <a:schemeClr val="accent1"/>
+            </a:lnRef>
+            <a:fillRef idx="0">
+              <a:schemeClr val="accent1"/>
+            </a:fillRef>
+            <a:effectRef idx="0">
+              <a:schemeClr val="accent1"/>
+            </a:effectRef>
+            <a:fontRef idx="minor">
+              <a:schemeClr val="tx1"/>
+            </a:fontRef>
+          </p:style>
+        </p:cxnSp>
+      </p:grpSp>
+    </p:spTree>
+    <p:extLst>
+      <p:ext uri="{BB962C8B-B14F-4D97-AF65-F5344CB8AC3E}">
+        <p14:creationId xmlns:p14="http://schemas.microsoft.com/office/powerpoint/2010/main" val="4233642666"/>
+      </p:ext>
+    </p:extLst>
+  </p:cSld>
+  <p:clrMapOvr>
+    <a:masterClrMapping/>
+  </p:clrMapOvr>
+</p:sld>
+</file>
+
+<file path=ppt/slides/slide12.xml><?xml version="1.0" encoding="utf-8"?>
+<p:sld xmlns:a="http://schemas.openxmlformats.org/drawingml/2006/main" xmlns:r="http://schemas.openxmlformats.org/officeDocument/2006/relationships" xmlns:p="http://schemas.openxmlformats.org/presentationml/2006/main">
+  <p:cSld>
+    <p:spTree>
+      <p:nvGrpSpPr>
+        <p:cNvPr id="1" name=""/>
+        <p:cNvGrpSpPr/>
+        <p:nvPr/>
+      </p:nvGrpSpPr>
+      <p:grpSpPr>
+        <a:xfrm>
+          <a:off x="0" y="0"/>
+          <a:ext cx="0" cy="0"/>
+          <a:chOff x="0" y="0"/>
+          <a:chExt cx="0" cy="0"/>
+        </a:xfrm>
+      </p:grpSpPr>
+    </p:spTree>
+    <p:extLst>
+      <p:ext uri="{BB962C8B-B14F-4D97-AF65-F5344CB8AC3E}">
+        <p14:creationId xmlns:p14="http://schemas.microsoft.com/office/powerpoint/2010/main" val="3187444541"/>
+      </p:ext>
+    </p:extLst>
+  </p:cSld>
+  <p:clrMapOvr>
+    <a:masterClrMapping/>
+  </p:clrMapOvr>
+</p:sld>
+</file>
+
+<file path=ppt/slides/slide13.xml><?xml version="1.0" encoding="utf-8"?>
+<p:sld xmlns:a="http://schemas.openxmlformats.org/drawingml/2006/main" xmlns:r="http://schemas.openxmlformats.org/officeDocument/2006/relationships" xmlns:p="http://schemas.openxmlformats.org/presentationml/2006/main">
+  <p:cSld>
+    <p:spTree>
+      <p:nvGrpSpPr>
+        <p:cNvPr id="1" name=""/>
+        <p:cNvGrpSpPr/>
+        <p:nvPr/>
+      </p:nvGrpSpPr>
+      <p:grpSpPr>
+        <a:xfrm>
+          <a:off x="0" y="0"/>
+          <a:ext cx="0" cy="0"/>
+          <a:chOff x="0" y="0"/>
+          <a:chExt cx="0" cy="0"/>
+        </a:xfrm>
+      </p:grpSpPr>
+    </p:spTree>
+    <p:extLst>
+      <p:ext uri="{BB962C8B-B14F-4D97-AF65-F5344CB8AC3E}">
+        <p14:creationId xmlns:p14="http://schemas.microsoft.com/office/powerpoint/2010/main" val="1620082001"/>
+      </p:ext>
+    </p:extLst>
+  </p:cSld>
+  <p:clrMapOvr>
+    <a:masterClrMapping/>
+  </p:clrMapOvr>
+</p:sld>
+</file>
+
+<file path=ppt/slides/slide14.xml><?xml version="1.0" encoding="utf-8"?>
+<p:sld xmlns:a="http://schemas.openxmlformats.org/drawingml/2006/main" xmlns:r="http://schemas.openxmlformats.org/officeDocument/2006/relationships" xmlns:p="http://schemas.openxmlformats.org/presentationml/2006/main">
+  <p:cSld>
+    <p:spTree>
+      <p:nvGrpSpPr>
+        <p:cNvPr id="1" name=""/>
+        <p:cNvGrpSpPr/>
+        <p:nvPr/>
+      </p:nvGrpSpPr>
+      <p:grpSpPr>
+        <a:xfrm>
+          <a:off x="0" y="0"/>
+          <a:ext cx="0" cy="0"/>
+          <a:chOff x="0" y="0"/>
+          <a:chExt cx="0" cy="0"/>
+        </a:xfrm>
+      </p:grpSpPr>
+    </p:spTree>
+    <p:extLst>
+      <p:ext uri="{BB962C8B-B14F-4D97-AF65-F5344CB8AC3E}">
+        <p14:creationId xmlns:p14="http://schemas.microsoft.com/office/powerpoint/2010/main" val="3212090696"/>
+      </p:ext>
+    </p:extLst>
+  </p:cSld>
+  <p:clrMapOvr>
+    <a:masterClrMapping/>
+  </p:clrMapOvr>
+</p:sld>
+</file>
+
+<file path=ppt/slides/slide15.xml><?xml version="1.0" encoding="utf-8"?>
+<p:sld xmlns:a="http://schemas.openxmlformats.org/drawingml/2006/main" xmlns:r="http://schemas.openxmlformats.org/officeDocument/2006/relationships" xmlns:p="http://schemas.openxmlformats.org/presentationml/2006/main">
+  <p:cSld>
+    <p:spTree>
+      <p:nvGrpSpPr>
+        <p:cNvPr id="1" name=""/>
+        <p:cNvGrpSpPr/>
+        <p:nvPr/>
+      </p:nvGrpSpPr>
+      <p:grpSpPr>
+        <a:xfrm>
+          <a:off x="0" y="0"/>
+          <a:ext cx="0" cy="0"/>
+          <a:chOff x="0" y="0"/>
+          <a:chExt cx="0" cy="0"/>
+        </a:xfrm>
+      </p:grpSpPr>
+    </p:spTree>
+    <p:extLst>
+      <p:ext uri="{BB962C8B-B14F-4D97-AF65-F5344CB8AC3E}">
+        <p14:creationId xmlns:p14="http://schemas.microsoft.com/office/powerpoint/2010/main" val="1292717655"/>
       </p:ext>
     </p:extLst>
   </p:cSld>
@@ -3979,6 +6104,1243 @@
 </p:sld>
 </file>
 
+<file path=ppt/slides/slide7.xml><?xml version="1.0" encoding="utf-8"?>
+<p:sld xmlns:a="http://schemas.openxmlformats.org/drawingml/2006/main" xmlns:r="http://schemas.openxmlformats.org/officeDocument/2006/relationships" xmlns:p="http://schemas.openxmlformats.org/presentationml/2006/main">
+  <p:cSld>
+    <p:spTree>
+      <p:nvGrpSpPr>
+        <p:cNvPr id="1" name=""/>
+        <p:cNvGrpSpPr/>
+        <p:nvPr/>
+      </p:nvGrpSpPr>
+      <p:grpSpPr>
+        <a:xfrm>
+          <a:off x="0" y="0"/>
+          <a:ext cx="0" cy="0"/>
+          <a:chOff x="0" y="0"/>
+          <a:chExt cx="0" cy="0"/>
+        </a:xfrm>
+      </p:grpSpPr>
+    </p:spTree>
+    <p:extLst>
+      <p:ext uri="{BB962C8B-B14F-4D97-AF65-F5344CB8AC3E}">
+        <p14:creationId xmlns:p14="http://schemas.microsoft.com/office/powerpoint/2010/main" val="321577013"/>
+      </p:ext>
+    </p:extLst>
+  </p:cSld>
+  <p:clrMapOvr>
+    <a:masterClrMapping/>
+  </p:clrMapOvr>
+</p:sld>
+</file>
+
+<file path=ppt/slides/slide8.xml><?xml version="1.0" encoding="utf-8"?>
+<p:sld xmlns:a="http://schemas.openxmlformats.org/drawingml/2006/main" xmlns:r="http://schemas.openxmlformats.org/officeDocument/2006/relationships" xmlns:p="http://schemas.openxmlformats.org/presentationml/2006/main">
+  <p:cSld>
+    <p:spTree>
+      <p:nvGrpSpPr>
+        <p:cNvPr id="1" name=""/>
+        <p:cNvGrpSpPr/>
+        <p:nvPr/>
+      </p:nvGrpSpPr>
+      <p:grpSpPr>
+        <a:xfrm>
+          <a:off x="0" y="0"/>
+          <a:ext cx="0" cy="0"/>
+          <a:chOff x="0" y="0"/>
+          <a:chExt cx="0" cy="0"/>
+        </a:xfrm>
+      </p:grpSpPr>
+      <p:pic>
+        <p:nvPicPr>
+          <p:cNvPr id="2" name="Picture 1"/>
+          <p:cNvPicPr>
+            <a:picLocks noChangeAspect="1"/>
+          </p:cNvPicPr>
+          <p:nvPr/>
+        </p:nvPicPr>
+        <p:blipFill>
+          <a:blip r:embed="rId2"/>
+          <a:stretch>
+            <a:fillRect/>
+          </a:stretch>
+        </p:blipFill>
+        <p:spPr>
+          <a:xfrm>
+            <a:off x="1145140" y="316196"/>
+            <a:ext cx="11880000" cy="6172151"/>
+          </a:xfrm>
+          <a:prstGeom prst="rect">
+            <a:avLst/>
+          </a:prstGeom>
+        </p:spPr>
+      </p:pic>
+      <p:sp>
+        <p:nvSpPr>
+          <p:cNvPr id="4" name="Rectangle 3"/>
+          <p:cNvSpPr/>
+          <p:nvPr/>
+        </p:nvSpPr>
+        <p:spPr>
+          <a:xfrm>
+            <a:off x="3307226" y="1265898"/>
+            <a:ext cx="1734797" cy="195431"/>
+          </a:xfrm>
+          <a:prstGeom prst="rect">
+            <a:avLst/>
+          </a:prstGeom>
+          <a:noFill/>
+          <a:ln w="28575">
+            <a:solidFill>
+              <a:srgbClr val="00B0F0"/>
+            </a:solidFill>
+          </a:ln>
+        </p:spPr>
+        <p:style>
+          <a:lnRef idx="2">
+            <a:schemeClr val="accent1">
+              <a:shade val="50000"/>
+            </a:schemeClr>
+          </a:lnRef>
+          <a:fillRef idx="1">
+            <a:schemeClr val="accent1"/>
+          </a:fillRef>
+          <a:effectRef idx="0">
+            <a:schemeClr val="accent1"/>
+          </a:effectRef>
+          <a:fontRef idx="minor">
+            <a:schemeClr val="lt1"/>
+          </a:fontRef>
+        </p:style>
+        <p:txBody>
+          <a:bodyPr rtlCol="0" anchor="ctr"/>
+          <a:lstStyle/>
+          <a:p>
+            <a:pPr algn="ctr"/>
+            <a:endParaRPr lang="en-PH"/>
+          </a:p>
+        </p:txBody>
+      </p:sp>
+      <p:cxnSp>
+        <p:nvCxnSpPr>
+          <p:cNvPr id="5" name="Straight Arrow Connector 4"/>
+          <p:cNvCxnSpPr/>
+          <p:nvPr/>
+        </p:nvCxnSpPr>
+        <p:spPr>
+          <a:xfrm flipH="1">
+            <a:off x="1245592" y="1468004"/>
+            <a:ext cx="2871163" cy="1406077"/>
+          </a:xfrm>
+          <a:prstGeom prst="straightConnector1">
+            <a:avLst/>
+          </a:prstGeom>
+          <a:ln>
+            <a:solidFill>
+              <a:srgbClr val="00B0F0"/>
+            </a:solidFill>
+            <a:tailEnd type="triangle"/>
+          </a:ln>
+        </p:spPr>
+        <p:style>
+          <a:lnRef idx="1">
+            <a:schemeClr val="accent1"/>
+          </a:lnRef>
+          <a:fillRef idx="0">
+            <a:schemeClr val="accent1"/>
+          </a:fillRef>
+          <a:effectRef idx="0">
+            <a:schemeClr val="accent1"/>
+          </a:effectRef>
+          <a:fontRef idx="minor">
+            <a:schemeClr val="tx1"/>
+          </a:fontRef>
+        </p:style>
+      </p:cxnSp>
+      <p:cxnSp>
+        <p:nvCxnSpPr>
+          <p:cNvPr id="6" name="Straight Arrow Connector 5"/>
+          <p:cNvCxnSpPr>
+            <a:stCxn id="11" idx="1"/>
+            <a:endCxn id="7" idx="0"/>
+          </p:cNvCxnSpPr>
+          <p:nvPr/>
+        </p:nvCxnSpPr>
+        <p:spPr>
+          <a:xfrm flipH="1">
+            <a:off x="491864" y="1972229"/>
+            <a:ext cx="811451" cy="565071"/>
+          </a:xfrm>
+          <a:prstGeom prst="straightConnector1">
+            <a:avLst/>
+          </a:prstGeom>
+          <a:ln w="19050">
+            <a:solidFill>
+              <a:srgbClr val="00B050"/>
+            </a:solidFill>
+            <a:tailEnd type="triangle"/>
+          </a:ln>
+        </p:spPr>
+        <p:style>
+          <a:lnRef idx="1">
+            <a:schemeClr val="accent1"/>
+          </a:lnRef>
+          <a:fillRef idx="0">
+            <a:schemeClr val="accent1"/>
+          </a:fillRef>
+          <a:effectRef idx="0">
+            <a:schemeClr val="accent1"/>
+          </a:effectRef>
+          <a:fontRef idx="minor">
+            <a:schemeClr val="tx1"/>
+          </a:fontRef>
+        </p:style>
+      </p:cxnSp>
+      <p:sp>
+        <p:nvSpPr>
+          <p:cNvPr id="7" name="TextBox 6"/>
+          <p:cNvSpPr txBox="1"/>
+          <p:nvPr/>
+        </p:nvSpPr>
+        <p:spPr>
+          <a:xfrm>
+            <a:off x="-261865" y="2537300"/>
+            <a:ext cx="1507457" cy="830997"/>
+          </a:xfrm>
+          <a:prstGeom prst="rect">
+            <a:avLst/>
+          </a:prstGeom>
+          <a:solidFill>
+            <a:schemeClr val="accent3">
+              <a:lumMod val="20000"/>
+              <a:lumOff val="80000"/>
+            </a:schemeClr>
+          </a:solidFill>
+        </p:spPr>
+        <p:txBody>
+          <a:bodyPr wrap="square" rtlCol="0">
+            <a:spAutoFit/>
+          </a:bodyPr>
+          <a:lstStyle/>
+          <a:p>
+            <a:pPr algn="ctr"/>
+            <a:r>
+              <a:rPr lang="en-US" sz="1600" dirty="0" smtClean="0">
+                <a:solidFill>
+                  <a:srgbClr val="00B050"/>
+                </a:solidFill>
+              </a:rPr>
+              <a:t>Images </a:t>
+            </a:r>
+            <a:r>
+              <a:rPr lang="en-US" sz="1600" dirty="0" smtClean="0"/>
+              <a:t>and </a:t>
+            </a:r>
+            <a:r>
+              <a:rPr lang="en-US" sz="1600" dirty="0" smtClean="0">
+                <a:solidFill>
+                  <a:srgbClr val="00B0F0"/>
+                </a:solidFill>
+              </a:rPr>
+              <a:t>texts </a:t>
+            </a:r>
+            <a:r>
+              <a:rPr lang="en-US" sz="1600" dirty="0" smtClean="0"/>
+              <a:t>to be extracted…</a:t>
+            </a:r>
+            <a:endParaRPr lang="en-PH" sz="1600" dirty="0">
+              <a:solidFill>
+                <a:srgbClr val="00B050"/>
+              </a:solidFill>
+            </a:endParaRPr>
+          </a:p>
+        </p:txBody>
+      </p:sp>
+      <p:sp>
+        <p:nvSpPr>
+          <p:cNvPr id="9" name="Rectangle 8"/>
+          <p:cNvSpPr/>
+          <p:nvPr/>
+        </p:nvSpPr>
+        <p:spPr>
+          <a:xfrm>
+            <a:off x="1303315" y="4736678"/>
+            <a:ext cx="1738992" cy="1681214"/>
+          </a:xfrm>
+          <a:prstGeom prst="rect">
+            <a:avLst/>
+          </a:prstGeom>
+          <a:noFill/>
+          <a:ln w="38100">
+            <a:solidFill>
+              <a:srgbClr val="00B050"/>
+            </a:solidFill>
+          </a:ln>
+        </p:spPr>
+        <p:style>
+          <a:lnRef idx="2">
+            <a:schemeClr val="accent1">
+              <a:shade val="50000"/>
+            </a:schemeClr>
+          </a:lnRef>
+          <a:fillRef idx="1">
+            <a:schemeClr val="accent1"/>
+          </a:fillRef>
+          <a:effectRef idx="0">
+            <a:schemeClr val="accent1"/>
+          </a:effectRef>
+          <a:fontRef idx="minor">
+            <a:schemeClr val="lt1"/>
+          </a:fontRef>
+        </p:style>
+        <p:txBody>
+          <a:bodyPr rtlCol="0" anchor="ctr"/>
+          <a:lstStyle/>
+          <a:p>
+            <a:pPr algn="ctr"/>
+            <a:endParaRPr lang="en-PH"/>
+          </a:p>
+        </p:txBody>
+      </p:sp>
+      <p:sp>
+        <p:nvSpPr>
+          <p:cNvPr id="10" name="Rectangle 9"/>
+          <p:cNvSpPr/>
+          <p:nvPr/>
+        </p:nvSpPr>
+        <p:spPr>
+          <a:xfrm>
+            <a:off x="1303315" y="3202072"/>
+            <a:ext cx="1738992" cy="1275924"/>
+          </a:xfrm>
+          <a:prstGeom prst="rect">
+            <a:avLst/>
+          </a:prstGeom>
+          <a:noFill/>
+          <a:ln w="38100">
+            <a:solidFill>
+              <a:srgbClr val="00B050"/>
+            </a:solidFill>
+          </a:ln>
+        </p:spPr>
+        <p:style>
+          <a:lnRef idx="2">
+            <a:schemeClr val="accent1">
+              <a:shade val="50000"/>
+            </a:schemeClr>
+          </a:lnRef>
+          <a:fillRef idx="1">
+            <a:schemeClr val="accent1"/>
+          </a:fillRef>
+          <a:effectRef idx="0">
+            <a:schemeClr val="accent1"/>
+          </a:effectRef>
+          <a:fontRef idx="minor">
+            <a:schemeClr val="lt1"/>
+          </a:fontRef>
+        </p:style>
+        <p:txBody>
+          <a:bodyPr rtlCol="0" anchor="ctr"/>
+          <a:lstStyle/>
+          <a:p>
+            <a:pPr algn="ctr"/>
+            <a:endParaRPr lang="en-PH"/>
+          </a:p>
+        </p:txBody>
+      </p:sp>
+      <p:sp>
+        <p:nvSpPr>
+          <p:cNvPr id="11" name="Rectangle 10"/>
+          <p:cNvSpPr/>
+          <p:nvPr/>
+        </p:nvSpPr>
+        <p:spPr>
+          <a:xfrm>
+            <a:off x="1303315" y="1334267"/>
+            <a:ext cx="1738992" cy="1275924"/>
+          </a:xfrm>
+          <a:prstGeom prst="rect">
+            <a:avLst/>
+          </a:prstGeom>
+          <a:noFill/>
+          <a:ln w="38100">
+            <a:solidFill>
+              <a:srgbClr val="00B050"/>
+            </a:solidFill>
+          </a:ln>
+        </p:spPr>
+        <p:style>
+          <a:lnRef idx="2">
+            <a:schemeClr val="accent1">
+              <a:shade val="50000"/>
+            </a:schemeClr>
+          </a:lnRef>
+          <a:fillRef idx="1">
+            <a:schemeClr val="accent1"/>
+          </a:fillRef>
+          <a:effectRef idx="0">
+            <a:schemeClr val="accent1"/>
+          </a:effectRef>
+          <a:fontRef idx="minor">
+            <a:schemeClr val="lt1"/>
+          </a:fontRef>
+        </p:style>
+        <p:txBody>
+          <a:bodyPr rtlCol="0" anchor="ctr"/>
+          <a:lstStyle/>
+          <a:p>
+            <a:pPr algn="ctr"/>
+            <a:endParaRPr lang="en-PH"/>
+          </a:p>
+        </p:txBody>
+      </p:sp>
+      <p:sp>
+        <p:nvSpPr>
+          <p:cNvPr id="13" name="Rectangle 12"/>
+          <p:cNvSpPr/>
+          <p:nvPr/>
+        </p:nvSpPr>
+        <p:spPr>
+          <a:xfrm>
+            <a:off x="3307226" y="4657458"/>
+            <a:ext cx="2888479" cy="181769"/>
+          </a:xfrm>
+          <a:prstGeom prst="rect">
+            <a:avLst/>
+          </a:prstGeom>
+          <a:noFill/>
+          <a:ln w="28575">
+            <a:solidFill>
+              <a:srgbClr val="00B0F0"/>
+            </a:solidFill>
+          </a:ln>
+        </p:spPr>
+        <p:style>
+          <a:lnRef idx="2">
+            <a:schemeClr val="accent1">
+              <a:shade val="50000"/>
+            </a:schemeClr>
+          </a:lnRef>
+          <a:fillRef idx="1">
+            <a:schemeClr val="accent1"/>
+          </a:fillRef>
+          <a:effectRef idx="0">
+            <a:schemeClr val="accent1"/>
+          </a:effectRef>
+          <a:fontRef idx="minor">
+            <a:schemeClr val="lt1"/>
+          </a:fontRef>
+        </p:style>
+        <p:txBody>
+          <a:bodyPr rtlCol="0" anchor="ctr"/>
+          <a:lstStyle/>
+          <a:p>
+            <a:pPr algn="ctr"/>
+            <a:endParaRPr lang="en-PH"/>
+          </a:p>
+        </p:txBody>
+      </p:sp>
+      <p:sp>
+        <p:nvSpPr>
+          <p:cNvPr id="14" name="Rectangle 13"/>
+          <p:cNvSpPr/>
+          <p:nvPr/>
+        </p:nvSpPr>
+        <p:spPr>
+          <a:xfrm>
+            <a:off x="3157752" y="1512605"/>
+            <a:ext cx="9404568" cy="1162229"/>
+          </a:xfrm>
+          <a:prstGeom prst="rect">
+            <a:avLst/>
+          </a:prstGeom>
+          <a:noFill/>
+          <a:ln w="28575">
+            <a:solidFill>
+              <a:srgbClr val="C00000"/>
+            </a:solidFill>
+          </a:ln>
+        </p:spPr>
+        <p:style>
+          <a:lnRef idx="2">
+            <a:schemeClr val="accent1">
+              <a:shade val="50000"/>
+            </a:schemeClr>
+          </a:lnRef>
+          <a:fillRef idx="1">
+            <a:schemeClr val="accent1"/>
+          </a:fillRef>
+          <a:effectRef idx="0">
+            <a:schemeClr val="accent1"/>
+          </a:effectRef>
+          <a:fontRef idx="minor">
+            <a:schemeClr val="lt1"/>
+          </a:fontRef>
+        </p:style>
+        <p:txBody>
+          <a:bodyPr rtlCol="0" anchor="ctr"/>
+          <a:lstStyle/>
+          <a:p>
+            <a:pPr algn="ctr"/>
+            <a:endParaRPr lang="en-PH"/>
+          </a:p>
+        </p:txBody>
+      </p:sp>
+      <p:sp>
+        <p:nvSpPr>
+          <p:cNvPr id="15" name="Rectangle 14"/>
+          <p:cNvSpPr/>
+          <p:nvPr/>
+        </p:nvSpPr>
+        <p:spPr>
+          <a:xfrm>
+            <a:off x="3149206" y="3368297"/>
+            <a:ext cx="9190923" cy="685871"/>
+          </a:xfrm>
+          <a:prstGeom prst="rect">
+            <a:avLst/>
+          </a:prstGeom>
+          <a:noFill/>
+          <a:ln w="28575">
+            <a:solidFill>
+              <a:srgbClr val="C00000"/>
+            </a:solidFill>
+          </a:ln>
+        </p:spPr>
+        <p:style>
+          <a:lnRef idx="2">
+            <a:schemeClr val="accent1">
+              <a:shade val="50000"/>
+            </a:schemeClr>
+          </a:lnRef>
+          <a:fillRef idx="1">
+            <a:schemeClr val="accent1"/>
+          </a:fillRef>
+          <a:effectRef idx="0">
+            <a:schemeClr val="accent1"/>
+          </a:effectRef>
+          <a:fontRef idx="minor">
+            <a:schemeClr val="lt1"/>
+          </a:fontRef>
+        </p:style>
+        <p:txBody>
+          <a:bodyPr rtlCol="0" anchor="ctr"/>
+          <a:lstStyle/>
+          <a:p>
+            <a:pPr algn="ctr"/>
+            <a:endParaRPr lang="en-PH"/>
+          </a:p>
+        </p:txBody>
+      </p:sp>
+      <p:sp>
+        <p:nvSpPr>
+          <p:cNvPr id="16" name="Rectangle 15"/>
+          <p:cNvSpPr/>
+          <p:nvPr/>
+        </p:nvSpPr>
+        <p:spPr>
+          <a:xfrm>
+            <a:off x="3157753" y="4841882"/>
+            <a:ext cx="2542296" cy="1576010"/>
+          </a:xfrm>
+          <a:prstGeom prst="rect">
+            <a:avLst/>
+          </a:prstGeom>
+          <a:noFill/>
+          <a:ln w="28575">
+            <a:solidFill>
+              <a:srgbClr val="C00000"/>
+            </a:solidFill>
+          </a:ln>
+        </p:spPr>
+        <p:style>
+          <a:lnRef idx="2">
+            <a:schemeClr val="accent1">
+              <a:shade val="50000"/>
+            </a:schemeClr>
+          </a:lnRef>
+          <a:fillRef idx="1">
+            <a:schemeClr val="accent1"/>
+          </a:fillRef>
+          <a:effectRef idx="0">
+            <a:schemeClr val="accent1"/>
+          </a:effectRef>
+          <a:fontRef idx="minor">
+            <a:schemeClr val="lt1"/>
+          </a:fontRef>
+        </p:style>
+        <p:txBody>
+          <a:bodyPr rtlCol="0" anchor="ctr"/>
+          <a:lstStyle/>
+          <a:p>
+            <a:pPr algn="ctr"/>
+            <a:endParaRPr lang="en-PH"/>
+          </a:p>
+        </p:txBody>
+      </p:sp>
+      <p:cxnSp>
+        <p:nvCxnSpPr>
+          <p:cNvPr id="19" name="Straight Arrow Connector 18"/>
+          <p:cNvCxnSpPr>
+            <a:endCxn id="7" idx="2"/>
+          </p:cNvCxnSpPr>
+          <p:nvPr/>
+        </p:nvCxnSpPr>
+        <p:spPr>
+          <a:xfrm flipH="1" flipV="1">
+            <a:off x="491864" y="3368297"/>
+            <a:ext cx="811452" cy="471737"/>
+          </a:xfrm>
+          <a:prstGeom prst="straightConnector1">
+            <a:avLst/>
+          </a:prstGeom>
+          <a:ln w="19050">
+            <a:solidFill>
+              <a:srgbClr val="00B050"/>
+            </a:solidFill>
+            <a:tailEnd type="triangle"/>
+          </a:ln>
+        </p:spPr>
+        <p:style>
+          <a:lnRef idx="1">
+            <a:schemeClr val="accent1"/>
+          </a:lnRef>
+          <a:fillRef idx="0">
+            <a:schemeClr val="accent1"/>
+          </a:fillRef>
+          <a:effectRef idx="0">
+            <a:schemeClr val="accent1"/>
+          </a:effectRef>
+          <a:fontRef idx="minor">
+            <a:schemeClr val="tx1"/>
+          </a:fontRef>
+        </p:style>
+      </p:cxnSp>
+      <p:cxnSp>
+        <p:nvCxnSpPr>
+          <p:cNvPr id="21" name="Straight Arrow Connector 20"/>
+          <p:cNvCxnSpPr>
+            <a:endCxn id="7" idx="2"/>
+          </p:cNvCxnSpPr>
+          <p:nvPr/>
+        </p:nvCxnSpPr>
+        <p:spPr>
+          <a:xfrm flipH="1" flipV="1">
+            <a:off x="491864" y="3368297"/>
+            <a:ext cx="811451" cy="2261591"/>
+          </a:xfrm>
+          <a:prstGeom prst="straightConnector1">
+            <a:avLst/>
+          </a:prstGeom>
+          <a:ln w="19050">
+            <a:solidFill>
+              <a:srgbClr val="00B050"/>
+            </a:solidFill>
+            <a:tailEnd type="triangle"/>
+          </a:ln>
+        </p:spPr>
+        <p:style>
+          <a:lnRef idx="1">
+            <a:schemeClr val="accent1"/>
+          </a:lnRef>
+          <a:fillRef idx="0">
+            <a:schemeClr val="accent1"/>
+          </a:fillRef>
+          <a:effectRef idx="0">
+            <a:schemeClr val="accent1"/>
+          </a:effectRef>
+          <a:fontRef idx="minor">
+            <a:schemeClr val="tx1"/>
+          </a:fontRef>
+        </p:style>
+      </p:cxnSp>
+      <p:cxnSp>
+        <p:nvCxnSpPr>
+          <p:cNvPr id="26" name="Straight Arrow Connector 25"/>
+          <p:cNvCxnSpPr/>
+          <p:nvPr/>
+        </p:nvCxnSpPr>
+        <p:spPr>
+          <a:xfrm flipH="1" flipV="1">
+            <a:off x="1245592" y="3008338"/>
+            <a:ext cx="3505873" cy="1645599"/>
+          </a:xfrm>
+          <a:prstGeom prst="straightConnector1">
+            <a:avLst/>
+          </a:prstGeom>
+          <a:ln>
+            <a:solidFill>
+              <a:srgbClr val="00B0F0"/>
+            </a:solidFill>
+            <a:tailEnd type="triangle"/>
+          </a:ln>
+        </p:spPr>
+        <p:style>
+          <a:lnRef idx="1">
+            <a:schemeClr val="accent1"/>
+          </a:lnRef>
+          <a:fillRef idx="0">
+            <a:schemeClr val="accent1"/>
+          </a:fillRef>
+          <a:effectRef idx="0">
+            <a:schemeClr val="accent1"/>
+          </a:effectRef>
+          <a:fontRef idx="minor">
+            <a:schemeClr val="tx1"/>
+          </a:fontRef>
+        </p:style>
+      </p:cxnSp>
+    </p:spTree>
+    <p:extLst>
+      <p:ext uri="{BB962C8B-B14F-4D97-AF65-F5344CB8AC3E}">
+        <p14:creationId xmlns:p14="http://schemas.microsoft.com/office/powerpoint/2010/main" val="788580156"/>
+      </p:ext>
+    </p:extLst>
+  </p:cSld>
+  <p:clrMapOvr>
+    <a:masterClrMapping/>
+  </p:clrMapOvr>
+</p:sld>
+</file>
+
+<file path=ppt/slides/slide9.xml><?xml version="1.0" encoding="utf-8"?>
+<p:sld xmlns:a="http://schemas.openxmlformats.org/drawingml/2006/main" xmlns:r="http://schemas.openxmlformats.org/officeDocument/2006/relationships" xmlns:p="http://schemas.openxmlformats.org/presentationml/2006/main">
+  <p:cSld>
+    <p:spTree>
+      <p:nvGrpSpPr>
+        <p:cNvPr id="1" name=""/>
+        <p:cNvGrpSpPr/>
+        <p:nvPr/>
+      </p:nvGrpSpPr>
+      <p:grpSpPr>
+        <a:xfrm>
+          <a:off x="0" y="0"/>
+          <a:ext cx="0" cy="0"/>
+          <a:chOff x="0" y="0"/>
+          <a:chExt cx="0" cy="0"/>
+        </a:xfrm>
+      </p:grpSpPr>
+      <p:pic>
+        <p:nvPicPr>
+          <p:cNvPr id="2" name="Picture 1"/>
+          <p:cNvPicPr>
+            <a:picLocks noChangeAspect="1"/>
+          </p:cNvPicPr>
+          <p:nvPr/>
+        </p:nvPicPr>
+        <p:blipFill>
+          <a:blip r:embed="rId2"/>
+          <a:stretch>
+            <a:fillRect/>
+          </a:stretch>
+        </p:blipFill>
+        <p:spPr>
+          <a:xfrm>
+            <a:off x="1157522" y="315209"/>
+            <a:ext cx="11880000" cy="6305443"/>
+          </a:xfrm>
+          <a:prstGeom prst="rect">
+            <a:avLst/>
+          </a:prstGeom>
+        </p:spPr>
+      </p:pic>
+      <p:sp>
+        <p:nvSpPr>
+          <p:cNvPr id="3" name="Rectangle 2"/>
+          <p:cNvSpPr/>
+          <p:nvPr/>
+        </p:nvSpPr>
+        <p:spPr>
+          <a:xfrm>
+            <a:off x="2906085" y="1699537"/>
+            <a:ext cx="3417803" cy="1597051"/>
+          </a:xfrm>
+          <a:prstGeom prst="rect">
+            <a:avLst/>
+          </a:prstGeom>
+          <a:noFill/>
+          <a:ln w="28575">
+            <a:solidFill>
+              <a:srgbClr val="00B0F0"/>
+            </a:solidFill>
+          </a:ln>
+        </p:spPr>
+        <p:style>
+          <a:lnRef idx="2">
+            <a:schemeClr val="accent1">
+              <a:shade val="50000"/>
+            </a:schemeClr>
+          </a:lnRef>
+          <a:fillRef idx="1">
+            <a:schemeClr val="accent1"/>
+          </a:fillRef>
+          <a:effectRef idx="0">
+            <a:schemeClr val="accent1"/>
+          </a:effectRef>
+          <a:fontRef idx="minor">
+            <a:schemeClr val="lt1"/>
+          </a:fontRef>
+        </p:style>
+        <p:txBody>
+          <a:bodyPr rtlCol="0" anchor="ctr"/>
+          <a:lstStyle/>
+          <a:p>
+            <a:pPr algn="ctr"/>
+            <a:endParaRPr lang="en-PH"/>
+          </a:p>
+        </p:txBody>
+      </p:sp>
+      <p:cxnSp>
+        <p:nvCxnSpPr>
+          <p:cNvPr id="4" name="Straight Arrow Connector 3"/>
+          <p:cNvCxnSpPr>
+            <a:stCxn id="3" idx="1"/>
+            <a:endCxn id="6" idx="3"/>
+          </p:cNvCxnSpPr>
+          <p:nvPr/>
+        </p:nvCxnSpPr>
+        <p:spPr>
+          <a:xfrm flipH="1">
+            <a:off x="1230419" y="2498063"/>
+            <a:ext cx="1675666" cy="1026840"/>
+          </a:xfrm>
+          <a:prstGeom prst="straightConnector1">
+            <a:avLst/>
+          </a:prstGeom>
+          <a:ln>
+            <a:solidFill>
+              <a:srgbClr val="00B0F0"/>
+            </a:solidFill>
+            <a:tailEnd type="triangle"/>
+          </a:ln>
+        </p:spPr>
+        <p:style>
+          <a:lnRef idx="1">
+            <a:schemeClr val="accent1"/>
+          </a:lnRef>
+          <a:fillRef idx="0">
+            <a:schemeClr val="accent1"/>
+          </a:fillRef>
+          <a:effectRef idx="0">
+            <a:schemeClr val="accent1"/>
+          </a:effectRef>
+          <a:fontRef idx="minor">
+            <a:schemeClr val="tx1"/>
+          </a:fontRef>
+        </p:style>
+      </p:cxnSp>
+      <p:cxnSp>
+        <p:nvCxnSpPr>
+          <p:cNvPr id="5" name="Straight Arrow Connector 4"/>
+          <p:cNvCxnSpPr>
+            <a:stCxn id="9" idx="1"/>
+            <a:endCxn id="6" idx="0"/>
+          </p:cNvCxnSpPr>
+          <p:nvPr/>
+        </p:nvCxnSpPr>
+        <p:spPr>
+          <a:xfrm flipH="1">
+            <a:off x="476691" y="2576019"/>
+            <a:ext cx="826624" cy="533385"/>
+          </a:xfrm>
+          <a:prstGeom prst="straightConnector1">
+            <a:avLst/>
+          </a:prstGeom>
+          <a:ln w="19050">
+            <a:solidFill>
+              <a:srgbClr val="00B050"/>
+            </a:solidFill>
+            <a:tailEnd type="triangle"/>
+          </a:ln>
+        </p:spPr>
+        <p:style>
+          <a:lnRef idx="1">
+            <a:schemeClr val="accent1"/>
+          </a:lnRef>
+          <a:fillRef idx="0">
+            <a:schemeClr val="accent1"/>
+          </a:fillRef>
+          <a:effectRef idx="0">
+            <a:schemeClr val="accent1"/>
+          </a:effectRef>
+          <a:fontRef idx="minor">
+            <a:schemeClr val="tx1"/>
+          </a:fontRef>
+        </p:style>
+      </p:cxnSp>
+      <p:sp>
+        <p:nvSpPr>
+          <p:cNvPr id="6" name="TextBox 5"/>
+          <p:cNvSpPr txBox="1"/>
+          <p:nvPr/>
+        </p:nvSpPr>
+        <p:spPr>
+          <a:xfrm>
+            <a:off x="-277038" y="3109404"/>
+            <a:ext cx="1507457" cy="830997"/>
+          </a:xfrm>
+          <a:prstGeom prst="rect">
+            <a:avLst/>
+          </a:prstGeom>
+          <a:solidFill>
+            <a:schemeClr val="accent3">
+              <a:lumMod val="20000"/>
+              <a:lumOff val="80000"/>
+            </a:schemeClr>
+          </a:solidFill>
+        </p:spPr>
+        <p:txBody>
+          <a:bodyPr wrap="square" rtlCol="0">
+            <a:spAutoFit/>
+          </a:bodyPr>
+          <a:lstStyle/>
+          <a:p>
+            <a:pPr algn="ctr"/>
+            <a:r>
+              <a:rPr lang="en-US" sz="1600" dirty="0" smtClean="0">
+                <a:solidFill>
+                  <a:srgbClr val="00B050"/>
+                </a:solidFill>
+              </a:rPr>
+              <a:t>Images </a:t>
+            </a:r>
+            <a:r>
+              <a:rPr lang="en-US" sz="1600" dirty="0" smtClean="0"/>
+              <a:t>and </a:t>
+            </a:r>
+            <a:r>
+              <a:rPr lang="en-US" sz="1600" dirty="0" smtClean="0">
+                <a:solidFill>
+                  <a:srgbClr val="00B0F0"/>
+                </a:solidFill>
+              </a:rPr>
+              <a:t>texts </a:t>
+            </a:r>
+            <a:r>
+              <a:rPr lang="en-US" sz="1600" dirty="0" smtClean="0"/>
+              <a:t>to be extracted…</a:t>
+            </a:r>
+            <a:endParaRPr lang="en-PH" sz="1600" dirty="0">
+              <a:solidFill>
+                <a:srgbClr val="00B050"/>
+              </a:solidFill>
+            </a:endParaRPr>
+          </a:p>
+        </p:txBody>
+      </p:sp>
+      <p:sp>
+        <p:nvSpPr>
+          <p:cNvPr id="7" name="Rectangle 6"/>
+          <p:cNvSpPr/>
+          <p:nvPr/>
+        </p:nvSpPr>
+        <p:spPr>
+          <a:xfrm>
+            <a:off x="1303315" y="3875008"/>
+            <a:ext cx="1773171" cy="1056133"/>
+          </a:xfrm>
+          <a:prstGeom prst="rect">
+            <a:avLst/>
+          </a:prstGeom>
+          <a:noFill/>
+          <a:ln w="38100">
+            <a:solidFill>
+              <a:srgbClr val="00B050"/>
+            </a:solidFill>
+          </a:ln>
+        </p:spPr>
+        <p:style>
+          <a:lnRef idx="2">
+            <a:schemeClr val="accent1">
+              <a:shade val="50000"/>
+            </a:schemeClr>
+          </a:lnRef>
+          <a:fillRef idx="1">
+            <a:schemeClr val="accent1"/>
+          </a:fillRef>
+          <a:effectRef idx="0">
+            <a:schemeClr val="accent1"/>
+          </a:effectRef>
+          <a:fontRef idx="minor">
+            <a:schemeClr val="lt1"/>
+          </a:fontRef>
+        </p:style>
+        <p:txBody>
+          <a:bodyPr rtlCol="0" anchor="ctr"/>
+          <a:lstStyle/>
+          <a:p>
+            <a:pPr algn="ctr"/>
+            <a:endParaRPr lang="en-PH"/>
+          </a:p>
+        </p:txBody>
+      </p:sp>
+      <p:sp>
+        <p:nvSpPr>
+          <p:cNvPr id="9" name="Rectangle 8"/>
+          <p:cNvSpPr/>
+          <p:nvPr/>
+        </p:nvSpPr>
+        <p:spPr>
+          <a:xfrm>
+            <a:off x="1303315" y="1699537"/>
+            <a:ext cx="1456977" cy="1752964"/>
+          </a:xfrm>
+          <a:prstGeom prst="rect">
+            <a:avLst/>
+          </a:prstGeom>
+          <a:noFill/>
+          <a:ln w="38100">
+            <a:solidFill>
+              <a:srgbClr val="00B050"/>
+            </a:solidFill>
+          </a:ln>
+        </p:spPr>
+        <p:style>
+          <a:lnRef idx="2">
+            <a:schemeClr val="accent1">
+              <a:shade val="50000"/>
+            </a:schemeClr>
+          </a:lnRef>
+          <a:fillRef idx="1">
+            <a:schemeClr val="accent1"/>
+          </a:fillRef>
+          <a:effectRef idx="0">
+            <a:schemeClr val="accent1"/>
+          </a:effectRef>
+          <a:fontRef idx="minor">
+            <a:schemeClr val="lt1"/>
+          </a:fontRef>
+        </p:style>
+        <p:txBody>
+          <a:bodyPr rtlCol="0" anchor="ctr"/>
+          <a:lstStyle/>
+          <a:p>
+            <a:pPr algn="ctr"/>
+            <a:endParaRPr lang="en-PH"/>
+          </a:p>
+        </p:txBody>
+      </p:sp>
+      <p:sp>
+        <p:nvSpPr>
+          <p:cNvPr id="10" name="Rectangle 9"/>
+          <p:cNvSpPr/>
+          <p:nvPr/>
+        </p:nvSpPr>
+        <p:spPr>
+          <a:xfrm>
+            <a:off x="3222279" y="3989969"/>
+            <a:ext cx="3759635" cy="829859"/>
+          </a:xfrm>
+          <a:prstGeom prst="rect">
+            <a:avLst/>
+          </a:prstGeom>
+          <a:noFill/>
+          <a:ln w="28575">
+            <a:solidFill>
+              <a:srgbClr val="00B0F0"/>
+            </a:solidFill>
+          </a:ln>
+        </p:spPr>
+        <p:style>
+          <a:lnRef idx="2">
+            <a:schemeClr val="accent1">
+              <a:shade val="50000"/>
+            </a:schemeClr>
+          </a:lnRef>
+          <a:fillRef idx="1">
+            <a:schemeClr val="accent1"/>
+          </a:fillRef>
+          <a:effectRef idx="0">
+            <a:schemeClr val="accent1"/>
+          </a:effectRef>
+          <a:fontRef idx="minor">
+            <a:schemeClr val="lt1"/>
+          </a:fontRef>
+        </p:style>
+        <p:txBody>
+          <a:bodyPr rtlCol="0" anchor="ctr"/>
+          <a:lstStyle/>
+          <a:p>
+            <a:pPr algn="ctr"/>
+            <a:endParaRPr lang="en-PH"/>
+          </a:p>
+        </p:txBody>
+      </p:sp>
+      <p:cxnSp>
+        <p:nvCxnSpPr>
+          <p:cNvPr id="13" name="Straight Arrow Connector 12"/>
+          <p:cNvCxnSpPr>
+            <a:stCxn id="7" idx="1"/>
+            <a:endCxn id="6" idx="2"/>
+          </p:cNvCxnSpPr>
+          <p:nvPr/>
+        </p:nvCxnSpPr>
+        <p:spPr>
+          <a:xfrm flipH="1" flipV="1">
+            <a:off x="476691" y="3940401"/>
+            <a:ext cx="826624" cy="462674"/>
+          </a:xfrm>
+          <a:prstGeom prst="straightConnector1">
+            <a:avLst/>
+          </a:prstGeom>
+          <a:ln w="19050">
+            <a:solidFill>
+              <a:srgbClr val="00B050"/>
+            </a:solidFill>
+            <a:tailEnd type="triangle"/>
+          </a:ln>
+        </p:spPr>
+        <p:style>
+          <a:lnRef idx="1">
+            <a:schemeClr val="accent1"/>
+          </a:lnRef>
+          <a:fillRef idx="0">
+            <a:schemeClr val="accent1"/>
+          </a:fillRef>
+          <a:effectRef idx="0">
+            <a:schemeClr val="accent1"/>
+          </a:effectRef>
+          <a:fontRef idx="minor">
+            <a:schemeClr val="tx1"/>
+          </a:fontRef>
+        </p:style>
+      </p:cxnSp>
+      <p:cxnSp>
+        <p:nvCxnSpPr>
+          <p:cNvPr id="14" name="Straight Arrow Connector 13"/>
+          <p:cNvCxnSpPr>
+            <a:endCxn id="6" idx="3"/>
+          </p:cNvCxnSpPr>
+          <p:nvPr/>
+        </p:nvCxnSpPr>
+        <p:spPr>
+          <a:xfrm flipH="1" flipV="1">
+            <a:off x="1230419" y="3524903"/>
+            <a:ext cx="1991860" cy="889420"/>
+          </a:xfrm>
+          <a:prstGeom prst="straightConnector1">
+            <a:avLst/>
+          </a:prstGeom>
+          <a:ln>
+            <a:solidFill>
+              <a:srgbClr val="00B0F0"/>
+            </a:solidFill>
+            <a:tailEnd type="triangle"/>
+          </a:ln>
+        </p:spPr>
+        <p:style>
+          <a:lnRef idx="1">
+            <a:schemeClr val="accent1"/>
+          </a:lnRef>
+          <a:fillRef idx="0">
+            <a:schemeClr val="accent1"/>
+          </a:fillRef>
+          <a:effectRef idx="0">
+            <a:schemeClr val="accent1"/>
+          </a:effectRef>
+          <a:fontRef idx="minor">
+            <a:schemeClr val="tx1"/>
+          </a:fontRef>
+        </p:style>
+      </p:cxnSp>
+      <p:sp>
+        <p:nvSpPr>
+          <p:cNvPr id="23" name="Rectangle 22"/>
+          <p:cNvSpPr/>
+          <p:nvPr/>
+        </p:nvSpPr>
+        <p:spPr>
+          <a:xfrm>
+            <a:off x="1157521" y="4836829"/>
+            <a:ext cx="4388699" cy="1783823"/>
+          </a:xfrm>
+          <a:prstGeom prst="rect">
+            <a:avLst/>
+          </a:prstGeom>
+          <a:noFill/>
+          <a:ln w="28575">
+            <a:solidFill>
+              <a:srgbClr val="00B0F0"/>
+            </a:solidFill>
+          </a:ln>
+        </p:spPr>
+        <p:style>
+          <a:lnRef idx="2">
+            <a:schemeClr val="accent1">
+              <a:shade val="50000"/>
+            </a:schemeClr>
+          </a:lnRef>
+          <a:fillRef idx="1">
+            <a:schemeClr val="accent1"/>
+          </a:fillRef>
+          <a:effectRef idx="0">
+            <a:schemeClr val="accent1"/>
+          </a:effectRef>
+          <a:fontRef idx="minor">
+            <a:schemeClr val="lt1"/>
+          </a:fontRef>
+        </p:style>
+        <p:txBody>
+          <a:bodyPr rtlCol="0" anchor="ctr"/>
+          <a:lstStyle/>
+          <a:p>
+            <a:pPr algn="ctr"/>
+            <a:endParaRPr lang="en-PH"/>
+          </a:p>
+        </p:txBody>
+      </p:sp>
+      <p:cxnSp>
+        <p:nvCxnSpPr>
+          <p:cNvPr id="26" name="Straight Arrow Connector 25"/>
+          <p:cNvCxnSpPr>
+            <a:stCxn id="23" idx="1"/>
+            <a:endCxn id="6" idx="2"/>
+          </p:cNvCxnSpPr>
+          <p:nvPr/>
+        </p:nvCxnSpPr>
+        <p:spPr>
+          <a:xfrm flipH="1" flipV="1">
+            <a:off x="476691" y="3940401"/>
+            <a:ext cx="680830" cy="1788340"/>
+          </a:xfrm>
+          <a:prstGeom prst="straightConnector1">
+            <a:avLst/>
+          </a:prstGeom>
+          <a:ln>
+            <a:solidFill>
+              <a:srgbClr val="00B0F0"/>
+            </a:solidFill>
+            <a:tailEnd type="triangle"/>
+          </a:ln>
+        </p:spPr>
+        <p:style>
+          <a:lnRef idx="1">
+            <a:schemeClr val="accent1"/>
+          </a:lnRef>
+          <a:fillRef idx="0">
+            <a:schemeClr val="accent1"/>
+          </a:fillRef>
+          <a:effectRef idx="0">
+            <a:schemeClr val="accent1"/>
+          </a:effectRef>
+          <a:fontRef idx="minor">
+            <a:schemeClr val="tx1"/>
+          </a:fontRef>
+        </p:style>
+      </p:cxnSp>
+    </p:spTree>
+    <p:extLst>
+      <p:ext uri="{BB962C8B-B14F-4D97-AF65-F5344CB8AC3E}">
+        <p14:creationId xmlns:p14="http://schemas.microsoft.com/office/powerpoint/2010/main" val="4271403887"/>
+      </p:ext>
+    </p:extLst>
+  </p:cSld>
+  <p:clrMapOvr>
+    <a:masterClrMapping/>
+  </p:clrMapOvr>
+</p:sld>
+</file>
+
 <file path=ppt/theme/theme1.xml><?xml version="1.0" encoding="utf-8"?>
 <a:theme xmlns:a="http://schemas.openxmlformats.org/drawingml/2006/main" name="Office Theme">
   <a:themeElements>

</xml_diff>

<commit_message>
Added an additional query for the web scraping project
</commit_message>
<xml_diff>
--- a/activefence/extract.pptx
+++ b/activefence/extract.pptx
@@ -257,7 +257,7 @@
           <a:p>
             <a:fld id="{90139234-86BD-40A6-83E6-2AE3818AAA65}" type="datetimeFigureOut">
               <a:rPr lang="en-PH" smtClean="0"/>
-              <a:t>01/11/2023</a:t>
+              <a:t>02/11/2023</a:t>
             </a:fld>
             <a:endParaRPr lang="en-PH"/>
           </a:p>
@@ -427,7 +427,7 @@
           <a:p>
             <a:fld id="{90139234-86BD-40A6-83E6-2AE3818AAA65}" type="datetimeFigureOut">
               <a:rPr lang="en-PH" smtClean="0"/>
-              <a:t>01/11/2023</a:t>
+              <a:t>02/11/2023</a:t>
             </a:fld>
             <a:endParaRPr lang="en-PH"/>
           </a:p>
@@ -607,7 +607,7 @@
           <a:p>
             <a:fld id="{90139234-86BD-40A6-83E6-2AE3818AAA65}" type="datetimeFigureOut">
               <a:rPr lang="en-PH" smtClean="0"/>
-              <a:t>01/11/2023</a:t>
+              <a:t>02/11/2023</a:t>
             </a:fld>
             <a:endParaRPr lang="en-PH"/>
           </a:p>
@@ -777,7 +777,7 @@
           <a:p>
             <a:fld id="{90139234-86BD-40A6-83E6-2AE3818AAA65}" type="datetimeFigureOut">
               <a:rPr lang="en-PH" smtClean="0"/>
-              <a:t>01/11/2023</a:t>
+              <a:t>02/11/2023</a:t>
             </a:fld>
             <a:endParaRPr lang="en-PH"/>
           </a:p>
@@ -1023,7 +1023,7 @@
           <a:p>
             <a:fld id="{90139234-86BD-40A6-83E6-2AE3818AAA65}" type="datetimeFigureOut">
               <a:rPr lang="en-PH" smtClean="0"/>
-              <a:t>01/11/2023</a:t>
+              <a:t>02/11/2023</a:t>
             </a:fld>
             <a:endParaRPr lang="en-PH"/>
           </a:p>
@@ -1255,7 +1255,7 @@
           <a:p>
             <a:fld id="{90139234-86BD-40A6-83E6-2AE3818AAA65}" type="datetimeFigureOut">
               <a:rPr lang="en-PH" smtClean="0"/>
-              <a:t>01/11/2023</a:t>
+              <a:t>02/11/2023</a:t>
             </a:fld>
             <a:endParaRPr lang="en-PH"/>
           </a:p>
@@ -1622,7 +1622,7 @@
           <a:p>
             <a:fld id="{90139234-86BD-40A6-83E6-2AE3818AAA65}" type="datetimeFigureOut">
               <a:rPr lang="en-PH" smtClean="0"/>
-              <a:t>01/11/2023</a:t>
+              <a:t>02/11/2023</a:t>
             </a:fld>
             <a:endParaRPr lang="en-PH"/>
           </a:p>
@@ -1740,7 +1740,7 @@
           <a:p>
             <a:fld id="{90139234-86BD-40A6-83E6-2AE3818AAA65}" type="datetimeFigureOut">
               <a:rPr lang="en-PH" smtClean="0"/>
-              <a:t>01/11/2023</a:t>
+              <a:t>02/11/2023</a:t>
             </a:fld>
             <a:endParaRPr lang="en-PH"/>
           </a:p>
@@ -1835,7 +1835,7 @@
           <a:p>
             <a:fld id="{90139234-86BD-40A6-83E6-2AE3818AAA65}" type="datetimeFigureOut">
               <a:rPr lang="en-PH" smtClean="0"/>
-              <a:t>01/11/2023</a:t>
+              <a:t>02/11/2023</a:t>
             </a:fld>
             <a:endParaRPr lang="en-PH"/>
           </a:p>
@@ -2112,7 +2112,7 @@
           <a:p>
             <a:fld id="{90139234-86BD-40A6-83E6-2AE3818AAA65}" type="datetimeFigureOut">
               <a:rPr lang="en-PH" smtClean="0"/>
-              <a:t>01/11/2023</a:t>
+              <a:t>02/11/2023</a:t>
             </a:fld>
             <a:endParaRPr lang="en-PH"/>
           </a:p>
@@ -2365,7 +2365,7 @@
           <a:p>
             <a:fld id="{90139234-86BD-40A6-83E6-2AE3818AAA65}" type="datetimeFigureOut">
               <a:rPr lang="en-PH" smtClean="0"/>
-              <a:t>01/11/2023</a:t>
+              <a:t>02/11/2023</a:t>
             </a:fld>
             <a:endParaRPr lang="en-PH"/>
           </a:p>
@@ -2578,7 +2578,7 @@
           <a:p>
             <a:fld id="{90139234-86BD-40A6-83E6-2AE3818AAA65}" type="datetimeFigureOut">
               <a:rPr lang="en-PH" smtClean="0"/>
-              <a:t>01/11/2023</a:t>
+              <a:t>02/11/2023</a:t>
             </a:fld>
             <a:endParaRPr lang="en-PH"/>
           </a:p>
@@ -5047,6 +5047,30 @@
           <a:chExt cx="0" cy="0"/>
         </a:xfrm>
       </p:grpSpPr>
+      <p:pic>
+        <p:nvPicPr>
+          <p:cNvPr id="2" name="Picture 1"/>
+          <p:cNvPicPr>
+            <a:picLocks noChangeAspect="1"/>
+          </p:cNvPicPr>
+          <p:nvPr/>
+        </p:nvPicPr>
+        <p:blipFill>
+          <a:blip r:embed="rId2"/>
+          <a:stretch>
+            <a:fillRect/>
+          </a:stretch>
+        </p:blipFill>
+        <p:spPr>
+          <a:xfrm>
+            <a:off x="2062745" y="264624"/>
+            <a:ext cx="8914682" cy="6480000"/>
+          </a:xfrm>
+          <a:prstGeom prst="rect">
+            <a:avLst/>
+          </a:prstGeom>
+        </p:spPr>
+      </p:pic>
     </p:spTree>
     <p:extLst>
       <p:ext uri="{BB962C8B-B14F-4D97-AF65-F5344CB8AC3E}">

</xml_diff>